<commit_message>
cleanup and write up for quadcopter assembly
</commit_message>
<xml_diff>
--- a/labs/Implementing-PID/Implementing-PID.pptx
+++ b/labs/Implementing-PID/Implementing-PID.pptx
@@ -6,25 +6,25 @@
   </p:sldMasterIdLst>
   <p:sldIdLst>
     <p:sldId id="256" r:id="rId2"/>
-    <p:sldId id="262" r:id="rId3"/>
-    <p:sldId id="267" r:id="rId4"/>
-    <p:sldId id="268" r:id="rId5"/>
-    <p:sldId id="269" r:id="rId6"/>
-    <p:sldId id="270" r:id="rId7"/>
-    <p:sldId id="271" r:id="rId8"/>
-    <p:sldId id="272" r:id="rId9"/>
-    <p:sldId id="273" r:id="rId10"/>
-    <p:sldId id="274" r:id="rId11"/>
-    <p:sldId id="260" r:id="rId12"/>
-    <p:sldId id="257" r:id="rId13"/>
-    <p:sldId id="258" r:id="rId14"/>
-    <p:sldId id="278" r:id="rId15"/>
-    <p:sldId id="279" r:id="rId16"/>
-    <p:sldId id="280" r:id="rId17"/>
-    <p:sldId id="284" r:id="rId18"/>
-    <p:sldId id="281" r:id="rId19"/>
-    <p:sldId id="282" r:id="rId20"/>
-    <p:sldId id="283" r:id="rId21"/>
+    <p:sldId id="284" r:id="rId3"/>
+    <p:sldId id="281" r:id="rId4"/>
+    <p:sldId id="282" r:id="rId5"/>
+    <p:sldId id="283" r:id="rId6"/>
+    <p:sldId id="262" r:id="rId7"/>
+    <p:sldId id="267" r:id="rId8"/>
+    <p:sldId id="268" r:id="rId9"/>
+    <p:sldId id="269" r:id="rId10"/>
+    <p:sldId id="270" r:id="rId11"/>
+    <p:sldId id="271" r:id="rId12"/>
+    <p:sldId id="272" r:id="rId13"/>
+    <p:sldId id="273" r:id="rId14"/>
+    <p:sldId id="274" r:id="rId15"/>
+    <p:sldId id="260" r:id="rId16"/>
+    <p:sldId id="257" r:id="rId17"/>
+    <p:sldId id="258" r:id="rId18"/>
+    <p:sldId id="278" r:id="rId19"/>
+    <p:sldId id="279" r:id="rId20"/>
+    <p:sldId id="280" r:id="rId21"/>
   </p:sldIdLst>
   <p:sldSz cx="12192000" cy="6858000"/>
   <p:notesSz cx="6858000" cy="9144000"/>
@@ -123,6 +123,11 @@
       </a:defRPr>
     </a:lvl9pPr>
   </p:defaultTextStyle>
+  <p:extLst>
+    <p:ext uri="{EFAFB233-063F-42B5-8137-9DF3F51BA10A}">
+      <p15:sldGuideLst xmlns:p15="http://schemas.microsoft.com/office/powerpoint/2012/main"/>
+    </p:ext>
+  </p:extLst>
 </p:presentation>
 </file>
 
@@ -273,7 +278,7 @@
           <a:p>
             <a:fld id="{FEC42D17-91DA-8944-ACC7-FABA3CF20D0E}" type="datetimeFigureOut">
               <a:rPr lang="en-US" smtClean="0"/>
-              <a:t>2/26/19</a:t>
+              <a:t>5/7/19</a:t>
             </a:fld>
             <a:endParaRPr lang="en-US"/>
           </a:p>
@@ -471,7 +476,7 @@
           <a:p>
             <a:fld id="{FEC42D17-91DA-8944-ACC7-FABA3CF20D0E}" type="datetimeFigureOut">
               <a:rPr lang="en-US" smtClean="0"/>
-              <a:t>2/26/19</a:t>
+              <a:t>5/7/19</a:t>
             </a:fld>
             <a:endParaRPr lang="en-US"/>
           </a:p>
@@ -679,7 +684,7 @@
           <a:p>
             <a:fld id="{FEC42D17-91DA-8944-ACC7-FABA3CF20D0E}" type="datetimeFigureOut">
               <a:rPr lang="en-US" smtClean="0"/>
-              <a:t>2/26/19</a:t>
+              <a:t>5/7/19</a:t>
             </a:fld>
             <a:endParaRPr lang="en-US"/>
           </a:p>
@@ -877,7 +882,7 @@
           <a:p>
             <a:fld id="{FEC42D17-91DA-8944-ACC7-FABA3CF20D0E}" type="datetimeFigureOut">
               <a:rPr lang="en-US" smtClean="0"/>
-              <a:t>2/26/19</a:t>
+              <a:t>5/7/19</a:t>
             </a:fld>
             <a:endParaRPr lang="en-US"/>
           </a:p>
@@ -1152,7 +1157,7 @@
           <a:p>
             <a:fld id="{FEC42D17-91DA-8944-ACC7-FABA3CF20D0E}" type="datetimeFigureOut">
               <a:rPr lang="en-US" smtClean="0"/>
-              <a:t>2/26/19</a:t>
+              <a:t>5/7/19</a:t>
             </a:fld>
             <a:endParaRPr lang="en-US"/>
           </a:p>
@@ -1417,7 +1422,7 @@
           <a:p>
             <a:fld id="{FEC42D17-91DA-8944-ACC7-FABA3CF20D0E}" type="datetimeFigureOut">
               <a:rPr lang="en-US" smtClean="0"/>
-              <a:t>2/26/19</a:t>
+              <a:t>5/7/19</a:t>
             </a:fld>
             <a:endParaRPr lang="en-US"/>
           </a:p>
@@ -1829,7 +1834,7 @@
           <a:p>
             <a:fld id="{FEC42D17-91DA-8944-ACC7-FABA3CF20D0E}" type="datetimeFigureOut">
               <a:rPr lang="en-US" smtClean="0"/>
-              <a:t>2/26/19</a:t>
+              <a:t>5/7/19</a:t>
             </a:fld>
             <a:endParaRPr lang="en-US"/>
           </a:p>
@@ -1970,7 +1975,7 @@
           <a:p>
             <a:fld id="{FEC42D17-91DA-8944-ACC7-FABA3CF20D0E}" type="datetimeFigureOut">
               <a:rPr lang="en-US" smtClean="0"/>
-              <a:t>2/26/19</a:t>
+              <a:t>5/7/19</a:t>
             </a:fld>
             <a:endParaRPr lang="en-US"/>
           </a:p>
@@ -2083,7 +2088,7 @@
           <a:p>
             <a:fld id="{FEC42D17-91DA-8944-ACC7-FABA3CF20D0E}" type="datetimeFigureOut">
               <a:rPr lang="en-US" smtClean="0"/>
-              <a:t>2/26/19</a:t>
+              <a:t>5/7/19</a:t>
             </a:fld>
             <a:endParaRPr lang="en-US"/>
           </a:p>
@@ -2394,7 +2399,7 @@
           <a:p>
             <a:fld id="{FEC42D17-91DA-8944-ACC7-FABA3CF20D0E}" type="datetimeFigureOut">
               <a:rPr lang="en-US" smtClean="0"/>
-              <a:t>2/26/19</a:t>
+              <a:t>5/7/19</a:t>
             </a:fld>
             <a:endParaRPr lang="en-US"/>
           </a:p>
@@ -2682,7 +2687,7 @@
           <a:p>
             <a:fld id="{FEC42D17-91DA-8944-ACC7-FABA3CF20D0E}" type="datetimeFigureOut">
               <a:rPr lang="en-US" smtClean="0"/>
-              <a:t>2/26/19</a:t>
+              <a:t>5/7/19</a:t>
             </a:fld>
             <a:endParaRPr lang="en-US"/>
           </a:p>
@@ -2923,7 +2928,7 @@
           <a:p>
             <a:fld id="{FEC42D17-91DA-8944-ACC7-FABA3CF20D0E}" type="datetimeFigureOut">
               <a:rPr lang="en-US" smtClean="0"/>
-              <a:t>2/26/19</a:t>
+              <a:t>5/7/19</a:t>
             </a:fld>
             <a:endParaRPr lang="en-US"/>
           </a:p>
@@ -3413,6 +3418,859 @@
       </p:grpSpPr>
       <p:sp>
         <p:nvSpPr>
+          <p:cNvPr id="46" name="Shape 46"/>
+          <p:cNvSpPr>
+            <a:spLocks noGrp="1"/>
+          </p:cNvSpPr>
+          <p:nvPr>
+            <p:ph type="title"/>
+          </p:nvPr>
+        </p:nvSpPr>
+        <p:spPr>
+          <a:prstGeom prst="rect">
+            <a:avLst/>
+          </a:prstGeom>
+        </p:spPr>
+        <p:txBody>
+          <a:bodyPr>
+            <a:normAutofit/>
+          </a:bodyPr>
+          <a:lstStyle>
+            <a:lvl1pPr defTabSz="420624">
+              <a:defRPr sz="5760"/>
+            </a:lvl1pPr>
+          </a:lstStyle>
+          <a:p>
+            <a:pPr lvl="0">
+              <a:defRPr sz="1800"/>
+            </a:pPr>
+            <a:r>
+              <a:rPr sz="4000" dirty="0"/>
+              <a:t>Closed loop control</a:t>
+            </a:r>
+          </a:p>
+        </p:txBody>
+      </p:sp>
+      <p:sp>
+        <p:nvSpPr>
+          <p:cNvPr id="47" name="Shape 47"/>
+          <p:cNvSpPr>
+            <a:spLocks noGrp="1"/>
+          </p:cNvSpPr>
+          <p:nvPr>
+            <p:ph idx="1"/>
+          </p:nvPr>
+        </p:nvSpPr>
+        <p:spPr>
+          <a:prstGeom prst="rect">
+            <a:avLst/>
+          </a:prstGeom>
+        </p:spPr>
+        <p:txBody>
+          <a:bodyPr/>
+          <a:lstStyle/>
+          <a:p>
+            <a:pPr lvl="0">
+              <a:defRPr sz="1800"/>
+            </a:pPr>
+            <a:r>
+              <a:rPr sz="2500"/>
+              <a:t>PID is the most common closed loop controller</a:t>
+            </a:r>
+            <a:br>
+              <a:rPr sz="2500"/>
+            </a:br>
+            <a:br>
+              <a:rPr sz="2500"/>
+            </a:br>
+            <a:br>
+              <a:rPr sz="2500"/>
+            </a:br>
+            <a:endParaRPr sz="2500"/>
+          </a:p>
+          <a:p>
+            <a:pPr lvl="0">
+              <a:defRPr sz="1800"/>
+            </a:pPr>
+            <a:endParaRPr sz="2500"/>
+          </a:p>
+          <a:p>
+            <a:pPr lvl="0">
+              <a:defRPr sz="1800"/>
+            </a:pPr>
+            <a:r>
+              <a:rPr sz="2500"/>
+              <a:t>Proportional: Directly against error</a:t>
+            </a:r>
+          </a:p>
+          <a:p>
+            <a:pPr lvl="0">
+              <a:defRPr sz="1800"/>
+            </a:pPr>
+            <a:r>
+              <a:rPr sz="2500"/>
+              <a:t>Integral: Remembers error over time</a:t>
+            </a:r>
+          </a:p>
+          <a:p>
+            <a:pPr lvl="0">
+              <a:defRPr sz="1800"/>
+            </a:pPr>
+            <a:r>
+              <a:rPr sz="2500"/>
+              <a:t>Derivative: Dampens response to avoid oscillations</a:t>
+            </a:r>
+          </a:p>
+        </p:txBody>
+      </p:sp>
+      <p:pic>
+        <p:nvPicPr>
+          <p:cNvPr id="48" name="pidloop.png"/>
+          <p:cNvPicPr/>
+          <p:nvPr/>
+        </p:nvPicPr>
+        <p:blipFill>
+          <a:blip r:embed="rId2">
+            <a:extLst/>
+          </a:blip>
+          <a:stretch>
+            <a:fillRect/>
+          </a:stretch>
+        </p:blipFill>
+        <p:spPr>
+          <a:xfrm>
+            <a:off x="6021313" y="2417668"/>
+            <a:ext cx="4377956" cy="1492486"/>
+          </a:xfrm>
+          <a:prstGeom prst="rect">
+            <a:avLst/>
+          </a:prstGeom>
+          <a:ln w="12700">
+            <a:miter lim="400000"/>
+          </a:ln>
+        </p:spPr>
+      </p:pic>
+      <p:pic>
+        <p:nvPicPr>
+          <p:cNvPr id="49" name="CodeCogsEqn-2.png"/>
+          <p:cNvPicPr/>
+          <p:nvPr/>
+        </p:nvPicPr>
+        <p:blipFill>
+          <a:blip r:embed="rId3">
+            <a:extLst/>
+          </a:blip>
+          <a:stretch>
+            <a:fillRect/>
+          </a:stretch>
+        </p:blipFill>
+        <p:spPr>
+          <a:xfrm>
+            <a:off x="1915537" y="2881471"/>
+            <a:ext cx="3977529" cy="564880"/>
+          </a:xfrm>
+          <a:prstGeom prst="rect">
+            <a:avLst/>
+          </a:prstGeom>
+          <a:ln w="12700">
+            <a:miter lim="400000"/>
+          </a:ln>
+        </p:spPr>
+      </p:pic>
+    </p:spTree>
+    <p:extLst>
+      <p:ext uri="{BB962C8B-B14F-4D97-AF65-F5344CB8AC3E}">
+        <p14:creationId xmlns:p14="http://schemas.microsoft.com/office/powerpoint/2010/main" val="1474286658"/>
+      </p:ext>
+    </p:extLst>
+  </p:cSld>
+  <p:clrMapOvr>
+    <a:masterClrMapping/>
+  </p:clrMapOvr>
+</p:sld>
+</file>
+
+<file path=ppt/slides/slide11.xml><?xml version="1.0" encoding="utf-8"?>
+<p:sld xmlns:a="http://schemas.openxmlformats.org/drawingml/2006/main" xmlns:r="http://schemas.openxmlformats.org/officeDocument/2006/relationships" xmlns:p="http://schemas.openxmlformats.org/presentationml/2006/main">
+  <p:cSld>
+    <p:spTree>
+      <p:nvGrpSpPr>
+        <p:cNvPr id="1" name=""/>
+        <p:cNvGrpSpPr/>
+        <p:nvPr/>
+      </p:nvGrpSpPr>
+      <p:grpSpPr>
+        <a:xfrm>
+          <a:off x="0" y="0"/>
+          <a:ext cx="0" cy="0"/>
+          <a:chOff x="0" y="0"/>
+          <a:chExt cx="0" cy="0"/>
+        </a:xfrm>
+      </p:grpSpPr>
+      <p:sp>
+        <p:nvSpPr>
+          <p:cNvPr id="51" name="Shape 51"/>
+          <p:cNvSpPr>
+            <a:spLocks noGrp="1"/>
+          </p:cNvSpPr>
+          <p:nvPr>
+            <p:ph type="title"/>
+          </p:nvPr>
+        </p:nvSpPr>
+        <p:spPr>
+          <a:prstGeom prst="rect">
+            <a:avLst/>
+          </a:prstGeom>
+        </p:spPr>
+        <p:txBody>
+          <a:bodyPr/>
+          <a:lstStyle/>
+          <a:p>
+            <a:pPr lvl="0">
+              <a:defRPr sz="1800"/>
+            </a:pPr>
+            <a:r>
+              <a:rPr sz="5600" dirty="0"/>
+              <a:t>Example</a:t>
+            </a:r>
+          </a:p>
+        </p:txBody>
+      </p:sp>
+      <p:sp>
+        <p:nvSpPr>
+          <p:cNvPr id="52" name="Shape 52"/>
+          <p:cNvSpPr>
+            <a:spLocks noGrp="1"/>
+          </p:cNvSpPr>
+          <p:nvPr>
+            <p:ph idx="1"/>
+          </p:nvPr>
+        </p:nvSpPr>
+        <p:spPr>
+          <a:prstGeom prst="rect">
+            <a:avLst/>
+          </a:prstGeom>
+        </p:spPr>
+        <p:txBody>
+          <a:bodyPr anchor="t"/>
+          <a:lstStyle>
+            <a:lvl1pPr>
+              <a:defRPr u="sng">
+                <a:hlinkClick r:id="rId2"/>
+              </a:defRPr>
+            </a:lvl1pPr>
+          </a:lstStyle>
+          <a:p>
+            <a:pPr lvl="0">
+              <a:defRPr sz="1800" u="none"/>
+            </a:pPr>
+            <a:r>
+              <a:rPr sz="2500" dirty="0"/>
+              <a:t>https://sites.google.com/site/fpgaandco/pid</a:t>
+            </a:r>
+          </a:p>
+        </p:txBody>
+      </p:sp>
+      <p:pic>
+        <p:nvPicPr>
+          <p:cNvPr id="2" name="Picture 1"/>
+          <p:cNvPicPr>
+            <a:picLocks noChangeAspect="1"/>
+          </p:cNvPicPr>
+          <p:nvPr/>
+        </p:nvPicPr>
+        <p:blipFill>
+          <a:blip r:embed="rId3"/>
+          <a:stretch>
+            <a:fillRect/>
+          </a:stretch>
+        </p:blipFill>
+        <p:spPr>
+          <a:xfrm>
+            <a:off x="3671315" y="2498087"/>
+            <a:ext cx="4957828" cy="3752694"/>
+          </a:xfrm>
+          <a:prstGeom prst="rect">
+            <a:avLst/>
+          </a:prstGeom>
+        </p:spPr>
+      </p:pic>
+    </p:spTree>
+    <p:extLst>
+      <p:ext uri="{BB962C8B-B14F-4D97-AF65-F5344CB8AC3E}">
+        <p14:creationId xmlns:p14="http://schemas.microsoft.com/office/powerpoint/2010/main" val="2008722993"/>
+      </p:ext>
+    </p:extLst>
+  </p:cSld>
+  <p:clrMapOvr>
+    <a:masterClrMapping/>
+  </p:clrMapOvr>
+</p:sld>
+</file>
+
+<file path=ppt/slides/slide12.xml><?xml version="1.0" encoding="utf-8"?>
+<p:sld xmlns:a="http://schemas.openxmlformats.org/drawingml/2006/main" xmlns:r="http://schemas.openxmlformats.org/officeDocument/2006/relationships" xmlns:p="http://schemas.openxmlformats.org/presentationml/2006/main">
+  <p:cSld>
+    <p:spTree>
+      <p:nvGrpSpPr>
+        <p:cNvPr id="1" name=""/>
+        <p:cNvGrpSpPr/>
+        <p:nvPr/>
+      </p:nvGrpSpPr>
+      <p:grpSpPr>
+        <a:xfrm>
+          <a:off x="0" y="0"/>
+          <a:ext cx="0" cy="0"/>
+          <a:chOff x="0" y="0"/>
+          <a:chExt cx="0" cy="0"/>
+        </a:xfrm>
+      </p:grpSpPr>
+      <p:sp>
+        <p:nvSpPr>
+          <p:cNvPr id="55" name="Shape 55"/>
+          <p:cNvSpPr>
+            <a:spLocks noGrp="1"/>
+          </p:cNvSpPr>
+          <p:nvPr>
+            <p:ph type="title"/>
+          </p:nvPr>
+        </p:nvSpPr>
+        <p:spPr>
+          <a:prstGeom prst="rect">
+            <a:avLst/>
+          </a:prstGeom>
+        </p:spPr>
+        <p:txBody>
+          <a:bodyPr/>
+          <a:lstStyle/>
+          <a:p>
+            <a:pPr lvl="0">
+              <a:defRPr sz="1800"/>
+            </a:pPr>
+            <a:r>
+              <a:rPr sz="5600"/>
+              <a:t>PID on the Quadcopter</a:t>
+            </a:r>
+          </a:p>
+        </p:txBody>
+      </p:sp>
+      <p:sp>
+        <p:nvSpPr>
+          <p:cNvPr id="56" name="Shape 56"/>
+          <p:cNvSpPr>
+            <a:spLocks noGrp="1"/>
+          </p:cNvSpPr>
+          <p:nvPr>
+            <p:ph idx="1"/>
+          </p:nvPr>
+        </p:nvSpPr>
+        <p:spPr>
+          <a:prstGeom prst="rect">
+            <a:avLst/>
+          </a:prstGeom>
+        </p:spPr>
+        <p:txBody>
+          <a:bodyPr/>
+          <a:lstStyle/>
+          <a:p>
+            <a:pPr lvl="0">
+              <a:defRPr sz="1800"/>
+            </a:pPr>
+            <a:r>
+              <a:rPr sz="2500"/>
+              <a:t>3 separate controllers</a:t>
+            </a:r>
+          </a:p>
+          <a:p>
+            <a:pPr lvl="0">
+              <a:defRPr sz="1800"/>
+            </a:pPr>
+            <a:r>
+              <a:rPr sz="2500"/>
+              <a:t>PID set point is from user</a:t>
+            </a:r>
+          </a:p>
+        </p:txBody>
+      </p:sp>
+      <p:pic>
+        <p:nvPicPr>
+          <p:cNvPr id="57" name="pasted-image.tif"/>
+          <p:cNvPicPr/>
+          <p:nvPr/>
+        </p:nvPicPr>
+        <p:blipFill>
+          <a:blip r:embed="rId2">
+            <a:extLst/>
+          </a:blip>
+          <a:srcRect b="6714"/>
+          <a:stretch>
+            <a:fillRect/>
+          </a:stretch>
+        </p:blipFill>
+        <p:spPr>
+          <a:xfrm>
+            <a:off x="4295413" y="2806155"/>
+            <a:ext cx="3601077" cy="2478043"/>
+          </a:xfrm>
+          <a:prstGeom prst="rect">
+            <a:avLst/>
+          </a:prstGeom>
+          <a:ln w="12700">
+            <a:miter lim="400000"/>
+          </a:ln>
+        </p:spPr>
+      </p:pic>
+    </p:spTree>
+    <p:extLst>
+      <p:ext uri="{BB962C8B-B14F-4D97-AF65-F5344CB8AC3E}">
+        <p14:creationId xmlns:p14="http://schemas.microsoft.com/office/powerpoint/2010/main" val="3207057768"/>
+      </p:ext>
+    </p:extLst>
+  </p:cSld>
+  <p:clrMapOvr>
+    <a:masterClrMapping/>
+  </p:clrMapOvr>
+</p:sld>
+</file>
+
+<file path=ppt/slides/slide13.xml><?xml version="1.0" encoding="utf-8"?>
+<p:sld xmlns:a="http://schemas.openxmlformats.org/drawingml/2006/main" xmlns:r="http://schemas.openxmlformats.org/officeDocument/2006/relationships" xmlns:p="http://schemas.openxmlformats.org/presentationml/2006/main">
+  <p:cSld>
+    <p:spTree>
+      <p:nvGrpSpPr>
+        <p:cNvPr id="1" name=""/>
+        <p:cNvGrpSpPr/>
+        <p:nvPr/>
+      </p:nvGrpSpPr>
+      <p:grpSpPr>
+        <a:xfrm>
+          <a:off x="0" y="0"/>
+          <a:ext cx="0" cy="0"/>
+          <a:chOff x="0" y="0"/>
+          <a:chExt cx="0" cy="0"/>
+        </a:xfrm>
+      </p:grpSpPr>
+      <p:sp>
+        <p:nvSpPr>
+          <p:cNvPr id="59" name="Shape 59"/>
+          <p:cNvSpPr>
+            <a:spLocks noGrp="1"/>
+          </p:cNvSpPr>
+          <p:nvPr>
+            <p:ph type="title"/>
+          </p:nvPr>
+        </p:nvSpPr>
+        <p:spPr>
+          <a:prstGeom prst="rect">
+            <a:avLst/>
+          </a:prstGeom>
+        </p:spPr>
+        <p:txBody>
+          <a:bodyPr>
+            <a:normAutofit/>
+          </a:bodyPr>
+          <a:lstStyle>
+            <a:lvl1pPr defTabSz="514095">
+              <a:defRPr sz="7040"/>
+            </a:lvl1pPr>
+          </a:lstStyle>
+          <a:p>
+            <a:pPr lvl="0">
+              <a:defRPr sz="1800"/>
+            </a:pPr>
+            <a:r>
+              <a:rPr sz="4900" dirty="0"/>
+              <a:t>Pitfalls of PID</a:t>
+            </a:r>
+          </a:p>
+        </p:txBody>
+      </p:sp>
+      <p:sp>
+        <p:nvSpPr>
+          <p:cNvPr id="60" name="Shape 60"/>
+          <p:cNvSpPr>
+            <a:spLocks noGrp="1"/>
+          </p:cNvSpPr>
+          <p:nvPr>
+            <p:ph idx="1"/>
+          </p:nvPr>
+        </p:nvSpPr>
+        <p:spPr>
+          <a:prstGeom prst="rect">
+            <a:avLst/>
+          </a:prstGeom>
+        </p:spPr>
+        <p:txBody>
+          <a:bodyPr/>
+          <a:lstStyle/>
+          <a:p>
+            <a:pPr marL="316993" indent="-316993" defTabSz="291633">
+              <a:spcBef>
+                <a:spcPts val="2039"/>
+              </a:spcBef>
+              <a:buSzPct val="100000"/>
+              <a:buAutoNum type="arabicPeriod"/>
+              <a:defRPr sz="1800"/>
+            </a:pPr>
+            <a:r>
+              <a:rPr sz="1800" dirty="0"/>
+              <a:t>Integral term “Windup”</a:t>
+            </a:r>
+          </a:p>
+          <a:p>
+            <a:pPr marL="443789" lvl="1" indent="-221894" defTabSz="291633">
+              <a:spcBef>
+                <a:spcPts val="2039"/>
+              </a:spcBef>
+              <a:defRPr sz="1800"/>
+            </a:pPr>
+            <a:r>
+              <a:rPr sz="1800" dirty="0"/>
+              <a:t>One solution: </a:t>
+            </a:r>
+            <a:r>
+              <a:rPr lang="x-none" sz="1800" dirty="0"/>
+              <a:t>Exponential decay on integral (E.g., I = I/2 + error)</a:t>
+            </a:r>
+            <a:endParaRPr sz="1800" dirty="0"/>
+          </a:p>
+          <a:p>
+            <a:pPr marL="316993" indent="-316993" defTabSz="291633">
+              <a:spcBef>
+                <a:spcPts val="2039"/>
+              </a:spcBef>
+              <a:buSzPct val="100000"/>
+              <a:buAutoNum type="arabicPeriod" startAt="2"/>
+              <a:defRPr sz="1800"/>
+            </a:pPr>
+            <a:r>
+              <a:rPr sz="1800" dirty="0"/>
+              <a:t>Derivative noise: beware of vibrations</a:t>
+            </a:r>
+          </a:p>
+        </p:txBody>
+      </p:sp>
+      <p:grpSp>
+        <p:nvGrpSpPr>
+          <p:cNvPr id="2" name="Group 1"/>
+          <p:cNvGrpSpPr/>
+          <p:nvPr/>
+        </p:nvGrpSpPr>
+        <p:grpSpPr>
+          <a:xfrm>
+            <a:off x="3250787" y="3200837"/>
+            <a:ext cx="4878964" cy="1362757"/>
+            <a:chOff x="1185291" y="3976598"/>
+            <a:chExt cx="10989096" cy="3069396"/>
+          </a:xfrm>
+        </p:grpSpPr>
+        <p:pic>
+          <p:nvPicPr>
+            <p:cNvPr id="61" name="noisepid.png"/>
+            <p:cNvPicPr/>
+            <p:nvPr/>
+          </p:nvPicPr>
+          <p:blipFill>
+            <a:blip r:embed="rId2">
+              <a:extLst/>
+            </a:blip>
+            <a:stretch>
+              <a:fillRect/>
+            </a:stretch>
+          </p:blipFill>
+          <p:spPr>
+            <a:xfrm>
+              <a:off x="1185291" y="3976598"/>
+              <a:ext cx="3838257" cy="3069396"/>
+            </a:xfrm>
+            <a:prstGeom prst="rect">
+              <a:avLst/>
+            </a:prstGeom>
+            <a:ln w="12700">
+              <a:miter lim="400000"/>
+            </a:ln>
+          </p:spPr>
+        </p:pic>
+        <p:pic>
+          <p:nvPicPr>
+            <p:cNvPr id="62" name="noisederivpid.png"/>
+            <p:cNvPicPr/>
+            <p:nvPr/>
+          </p:nvPicPr>
+          <p:blipFill>
+            <a:blip r:embed="rId3">
+              <a:extLst/>
+            </a:blip>
+            <a:stretch>
+              <a:fillRect/>
+            </a:stretch>
+          </p:blipFill>
+          <p:spPr>
+            <a:xfrm>
+              <a:off x="7694346" y="3976598"/>
+              <a:ext cx="4480041" cy="3069396"/>
+            </a:xfrm>
+            <a:prstGeom prst="rect">
+              <a:avLst/>
+            </a:prstGeom>
+            <a:ln w="12700">
+              <a:miter lim="400000"/>
+            </a:ln>
+          </p:spPr>
+        </p:pic>
+        <p:sp>
+          <p:nvSpPr>
+            <p:cNvPr id="63" name="Shape 63"/>
+            <p:cNvSpPr/>
+            <p:nvPr/>
+          </p:nvSpPr>
+          <p:spPr>
+            <a:xfrm>
+              <a:off x="5867400" y="4876296"/>
+              <a:ext cx="1270000" cy="1270001"/>
+            </a:xfrm>
+            <a:prstGeom prst="rightArrow">
+              <a:avLst>
+                <a:gd name="adj1" fmla="val 32000"/>
+                <a:gd name="adj2" fmla="val 64000"/>
+              </a:avLst>
+            </a:prstGeom>
+            <a:blipFill>
+              <a:blip r:embed="rId4"/>
+            </a:blipFill>
+            <a:ln w="12700">
+              <a:miter lim="400000"/>
+            </a:ln>
+            <a:effectLst>
+              <a:outerShdw blurRad="38100" dist="25400" dir="5400000" rotWithShape="0">
+                <a:srgbClr val="000000">
+                  <a:alpha val="50000"/>
+                </a:srgbClr>
+              </a:outerShdw>
+            </a:effectLst>
+          </p:spPr>
+          <p:txBody>
+            <a:bodyPr lIns="50800" tIns="50800" rIns="50800" bIns="50800" anchor="ctr"/>
+            <a:lstStyle/>
+            <a:p>
+              <a:pPr lvl="0">
+                <a:defRPr sz="2400">
+                  <a:solidFill>
+                    <a:srgbClr val="FFFFFF"/>
+                  </a:solidFill>
+                </a:defRPr>
+              </a:pPr>
+              <a:endParaRPr sz="2400"/>
+            </a:p>
+          </p:txBody>
+        </p:sp>
+      </p:grpSp>
+      <p:sp>
+        <p:nvSpPr>
+          <p:cNvPr id="64" name="Shape 64"/>
+          <p:cNvSpPr/>
+          <p:nvPr/>
+        </p:nvSpPr>
+        <p:spPr>
+          <a:xfrm>
+            <a:off x="2474797" y="4563594"/>
+            <a:ext cx="1115336" cy="195242"/>
+          </a:xfrm>
+          <a:prstGeom prst="rect">
+            <a:avLst/>
+          </a:prstGeom>
+          <a:ln w="12700">
+            <a:miter lim="400000"/>
+          </a:ln>
+          <a:extLst>
+            <a:ext uri="{C572A759-6A51-4108-AA02-DFA0A04FC94B}">
+              <ma14:wrappingTextBoxFlag xmlns="" xmlns:ma14="http://schemas.microsoft.com/office/mac/drawingml/2011/main" val="1"/>
+            </a:ext>
+          </a:extLst>
+        </p:spPr>
+        <p:txBody>
+          <a:bodyPr wrap="none" lIns="35717" tIns="35717" rIns="35717" bIns="35717" anchor="ctr">
+            <a:spAutoFit/>
+          </a:bodyPr>
+          <a:lstStyle>
+            <a:lvl1pPr>
+              <a:defRPr sz="1200"/>
+            </a:lvl1pPr>
+          </a:lstStyle>
+          <a:p>
+            <a:pPr lvl="0">
+              <a:defRPr sz="1800"/>
+            </a:pPr>
+            <a:r>
+              <a:rPr sz="800"/>
+              <a:t>Error term with vibration</a:t>
+            </a:r>
+          </a:p>
+        </p:txBody>
+      </p:sp>
+      <p:sp>
+        <p:nvSpPr>
+          <p:cNvPr id="65" name="Shape 65"/>
+          <p:cNvSpPr/>
+          <p:nvPr/>
+        </p:nvSpPr>
+        <p:spPr>
+          <a:xfrm>
+            <a:off x="6820446" y="4563594"/>
+            <a:ext cx="2085603" cy="195242"/>
+          </a:xfrm>
+          <a:prstGeom prst="rect">
+            <a:avLst/>
+          </a:prstGeom>
+          <a:ln w="12700">
+            <a:miter lim="400000"/>
+          </a:ln>
+          <a:extLst>
+            <a:ext uri="{C572A759-6A51-4108-AA02-DFA0A04FC94B}">
+              <ma14:wrappingTextBoxFlag xmlns="" xmlns:ma14="http://schemas.microsoft.com/office/mac/drawingml/2011/main" val="1"/>
+            </a:ext>
+          </a:extLst>
+        </p:spPr>
+        <p:txBody>
+          <a:bodyPr wrap="none" lIns="35717" tIns="35717" rIns="35717" bIns="35717" anchor="ctr">
+            <a:spAutoFit/>
+          </a:bodyPr>
+          <a:lstStyle>
+            <a:lvl1pPr>
+              <a:defRPr sz="1200"/>
+            </a:lvl1pPr>
+          </a:lstStyle>
+          <a:p>
+            <a:pPr lvl="0">
+              <a:defRPr sz="1800"/>
+            </a:pPr>
+            <a:r>
+              <a:rPr sz="800"/>
+              <a:t>Derivative term causes your system to go insane</a:t>
+            </a:r>
+          </a:p>
+        </p:txBody>
+      </p:sp>
+      <p:sp>
+        <p:nvSpPr>
+          <p:cNvPr id="66" name="Shape 66"/>
+          <p:cNvSpPr/>
+          <p:nvPr/>
+        </p:nvSpPr>
+        <p:spPr>
+          <a:xfrm>
+            <a:off x="2263654" y="5043153"/>
+            <a:ext cx="7664695" cy="1439597"/>
+          </a:xfrm>
+          <a:prstGeom prst="rect">
+            <a:avLst/>
+          </a:prstGeom>
+          <a:ln w="12700">
+            <a:miter lim="400000"/>
+          </a:ln>
+          <a:extLst>
+            <a:ext uri="{C572A759-6A51-4108-AA02-DFA0A04FC94B}">
+              <ma14:wrappingTextBoxFlag xmlns="" xmlns:ma14="http://schemas.microsoft.com/office/mac/drawingml/2011/main" val="1"/>
+            </a:ext>
+          </a:extLst>
+        </p:spPr>
+        <p:txBody>
+          <a:bodyPr lIns="0" tIns="0" rIns="0" bIns="0" anchor="ctr">
+            <a:noAutofit/>
+          </a:bodyPr>
+          <a:lstStyle/>
+          <a:p>
+            <a:pPr marL="368782" lvl="1" indent="-184391" defTabSz="242342">
+              <a:spcBef>
+                <a:spcPts val="1687"/>
+              </a:spcBef>
+              <a:buSzPct val="75000"/>
+              <a:buChar char="•"/>
+              <a:defRPr sz="1800"/>
+            </a:pPr>
+            <a:r>
+              <a:rPr sz="2000" dirty="0"/>
+              <a:t>Solution: </a:t>
+            </a:r>
+            <a:r>
+              <a:rPr lang="x-none" sz="2000" dirty="0"/>
+              <a:t>moving average of last several values.  Or median of last several values.</a:t>
+            </a:r>
+          </a:p>
+          <a:p>
+            <a:pPr marL="368782" lvl="1" indent="-184391" defTabSz="242342">
+              <a:spcBef>
+                <a:spcPts val="1687"/>
+              </a:spcBef>
+              <a:buSzPct val="75000"/>
+              <a:buChar char="•"/>
+              <a:defRPr sz="1800"/>
+            </a:pPr>
+            <a:r>
+              <a:rPr lang="x-none" sz="2000" dirty="0"/>
+              <a:t>Using the serial plotter in arduino to watch the D term.</a:t>
+            </a:r>
+            <a:endParaRPr sz="2000" dirty="0"/>
+          </a:p>
+          <a:p>
+            <a:pPr defTabSz="242342">
+              <a:spcBef>
+                <a:spcPts val="1687"/>
+              </a:spcBef>
+              <a:defRPr sz="1800"/>
+            </a:pPr>
+            <a:r>
+              <a:rPr sz="2000" dirty="0"/>
+              <a:t>3. Tweaking PID values</a:t>
+            </a:r>
+            <a:endParaRPr lang="x-none" sz="2000" dirty="0"/>
+          </a:p>
+          <a:p>
+            <a:pPr defTabSz="242342">
+              <a:spcBef>
+                <a:spcPts val="1687"/>
+              </a:spcBef>
+              <a:defRPr sz="1800"/>
+            </a:pPr>
+            <a:r>
+              <a:rPr lang="x-none" sz="2000" dirty="0"/>
+              <a:t>	Tune P first, then D, then I.</a:t>
+            </a:r>
+          </a:p>
+        </p:txBody>
+      </p:sp>
+    </p:spTree>
+    <p:extLst>
+      <p:ext uri="{BB962C8B-B14F-4D97-AF65-F5344CB8AC3E}">
+        <p14:creationId xmlns:p14="http://schemas.microsoft.com/office/powerpoint/2010/main" val="188827023"/>
+      </p:ext>
+    </p:extLst>
+  </p:cSld>
+  <p:clrMapOvr>
+    <a:masterClrMapping/>
+  </p:clrMapOvr>
+</p:sld>
+</file>
+
+<file path=ppt/slides/slide14.xml><?xml version="1.0" encoding="utf-8"?>
+<p:sld xmlns:a="http://schemas.openxmlformats.org/drawingml/2006/main" xmlns:r="http://schemas.openxmlformats.org/officeDocument/2006/relationships" xmlns:p="http://schemas.openxmlformats.org/presentationml/2006/main" show="0">
+  <p:cSld>
+    <p:spTree>
+      <p:nvGrpSpPr>
+        <p:cNvPr id="1" name=""/>
+        <p:cNvGrpSpPr/>
+        <p:nvPr/>
+      </p:nvGrpSpPr>
+      <p:grpSpPr>
+        <a:xfrm>
+          <a:off x="0" y="0"/>
+          <a:ext cx="0" cy="0"/>
+          <a:chOff x="0" y="0"/>
+          <a:chExt cx="0" cy="0"/>
+        </a:xfrm>
+      </p:grpSpPr>
+      <p:sp>
+        <p:nvSpPr>
           <p:cNvPr id="2" name="Title 1"/>
           <p:cNvSpPr>
             <a:spLocks noGrp="1"/>
@@ -3530,8 +4388,8 @@
 </p:sld>
 </file>
 
-<file path=ppt/slides/slide11.xml><?xml version="1.0" encoding="utf-8"?>
-<p:sld xmlns:a="http://schemas.openxmlformats.org/drawingml/2006/main" xmlns:r="http://schemas.openxmlformats.org/officeDocument/2006/relationships" xmlns:p="http://schemas.openxmlformats.org/presentationml/2006/main">
+<file path=ppt/slides/slide15.xml><?xml version="1.0" encoding="utf-8"?>
+<p:sld xmlns:a="http://schemas.openxmlformats.org/drawingml/2006/main" xmlns:r="http://schemas.openxmlformats.org/officeDocument/2006/relationships" xmlns:p="http://schemas.openxmlformats.org/presentationml/2006/main" show="0">
   <p:cSld>
     <p:spTree>
       <p:nvGrpSpPr>
@@ -4007,7 +4865,7 @@
 </p:sld>
 </file>
 
-<file path=ppt/slides/slide12.xml><?xml version="1.0" encoding="utf-8"?>
+<file path=ppt/slides/slide16.xml><?xml version="1.0" encoding="utf-8"?>
 <p:sld xmlns:a="http://schemas.openxmlformats.org/drawingml/2006/main" xmlns:r="http://schemas.openxmlformats.org/officeDocument/2006/relationships" xmlns:p="http://schemas.openxmlformats.org/presentationml/2006/main">
   <p:cSld>
     <p:spTree>
@@ -4145,7 +5003,7 @@
 </p:sld>
 </file>
 
-<file path=ppt/slides/slide13.xml><?xml version="1.0" encoding="utf-8"?>
+<file path=ppt/slides/slide17.xml><?xml version="1.0" encoding="utf-8"?>
 <p:sld xmlns:a="http://schemas.openxmlformats.org/drawingml/2006/main" xmlns:r="http://schemas.openxmlformats.org/officeDocument/2006/relationships" xmlns:p="http://schemas.openxmlformats.org/presentationml/2006/main">
   <p:cSld>
     <p:spTree>
@@ -4282,7 +5140,7 @@
 </p:sld>
 </file>
 
-<file path=ppt/slides/slide14.xml><?xml version="1.0" encoding="utf-8"?>
+<file path=ppt/slides/slide18.xml><?xml version="1.0" encoding="utf-8"?>
 <p:sld xmlns:a="http://schemas.openxmlformats.org/drawingml/2006/main" xmlns:r="http://schemas.openxmlformats.org/officeDocument/2006/relationships" xmlns:p="http://schemas.openxmlformats.org/presentationml/2006/main">
   <p:cSld>
     <p:spTree>
@@ -4414,7 +5272,7 @@
 </p:sld>
 </file>
 
-<file path=ppt/slides/slide15.xml><?xml version="1.0" encoding="utf-8"?>
+<file path=ppt/slides/slide19.xml><?xml version="1.0" encoding="utf-8"?>
 <p:sld xmlns:a="http://schemas.openxmlformats.org/drawingml/2006/main" xmlns:r="http://schemas.openxmlformats.org/officeDocument/2006/relationships" xmlns:p="http://schemas.openxmlformats.org/presentationml/2006/main">
   <p:cSld>
     <p:spTree>
@@ -4463,12 +5321,7 @@
             <p:ph idx="1"/>
           </p:nvPr>
         </p:nvSpPr>
-        <p:spPr>
-          <a:xfrm>
-            <a:off x="1981200" y="1600201"/>
-            <a:ext cx="4635352" cy="4525963"/>
-          </a:xfrm>
-        </p:spPr>
+        <p:spPr/>
         <p:txBody>
           <a:bodyPr/>
           <a:lstStyle/>
@@ -4513,9 +5366,6 @@
             </a:r>
           </a:p>
           <a:p>
-            <a:pPr marL="0" indent="0">
-              <a:buNone/>
-            </a:pPr>
             <a:endParaRPr lang="en-US" dirty="0"/>
           </a:p>
         </p:txBody>
@@ -4557,150 +5407,7 @@
 </p:sld>
 </file>
 
-<file path=ppt/slides/slide16.xml><?xml version="1.0" encoding="utf-8"?>
-<p:sld xmlns:a="http://schemas.openxmlformats.org/drawingml/2006/main" xmlns:r="http://schemas.openxmlformats.org/officeDocument/2006/relationships" xmlns:p="http://schemas.openxmlformats.org/presentationml/2006/main">
-  <p:cSld>
-    <p:spTree>
-      <p:nvGrpSpPr>
-        <p:cNvPr id="1" name=""/>
-        <p:cNvGrpSpPr/>
-        <p:nvPr/>
-      </p:nvGrpSpPr>
-      <p:grpSpPr>
-        <a:xfrm>
-          <a:off x="0" y="0"/>
-          <a:ext cx="0" cy="0"/>
-          <a:chOff x="0" y="0"/>
-          <a:chExt cx="0" cy="0"/>
-        </a:xfrm>
-      </p:grpSpPr>
-      <p:sp>
-        <p:nvSpPr>
-          <p:cNvPr id="2" name="Title 1"/>
-          <p:cNvSpPr>
-            <a:spLocks noGrp="1"/>
-          </p:cNvSpPr>
-          <p:nvPr>
-            <p:ph type="title"/>
-          </p:nvPr>
-        </p:nvSpPr>
-        <p:spPr/>
-        <p:txBody>
-          <a:bodyPr/>
-          <a:lstStyle/>
-          <a:p>
-            <a:r>
-              <a:rPr lang="en-US" dirty="0"/>
-              <a:t>Controlling Yaw</a:t>
-            </a:r>
-          </a:p>
-        </p:txBody>
-      </p:sp>
-      <p:sp>
-        <p:nvSpPr>
-          <p:cNvPr id="3" name="Content Placeholder 2"/>
-          <p:cNvSpPr>
-            <a:spLocks noGrp="1"/>
-          </p:cNvSpPr>
-          <p:nvPr>
-            <p:ph idx="1"/>
-          </p:nvPr>
-        </p:nvSpPr>
-        <p:spPr>
-          <a:xfrm>
-            <a:off x="1981200" y="1600201"/>
-            <a:ext cx="4635352" cy="4525963"/>
-          </a:xfrm>
-        </p:spPr>
-        <p:txBody>
-          <a:bodyPr/>
-          <a:lstStyle/>
-          <a:p>
-            <a:r>
-              <a:rPr lang="en-US" dirty="0"/>
-              <a:t>Rotate CCW</a:t>
-            </a:r>
-          </a:p>
-          <a:p>
-            <a:pPr lvl="1"/>
-            <a:r>
-              <a:rPr lang="en-US" dirty="0"/>
-              <a:t>More thrust to the CCW motors</a:t>
-            </a:r>
-          </a:p>
-          <a:p>
-            <a:pPr lvl="1"/>
-            <a:r>
-              <a:rPr lang="en-US" dirty="0"/>
-              <a:t>Less to the CW</a:t>
-            </a:r>
-          </a:p>
-          <a:p>
-            <a:r>
-              <a:rPr lang="en-US" dirty="0"/>
-              <a:t>Rotate CW</a:t>
-            </a:r>
-          </a:p>
-          <a:p>
-            <a:pPr lvl="1"/>
-            <a:r>
-              <a:rPr lang="en-US" dirty="0"/>
-              <a:t>More thrust CW motors</a:t>
-            </a:r>
-          </a:p>
-          <a:p>
-            <a:pPr lvl="1"/>
-            <a:r>
-              <a:rPr lang="en-US" dirty="0"/>
-              <a:t>Less to the CCW</a:t>
-            </a:r>
-          </a:p>
-          <a:p>
-            <a:pPr marL="0" indent="0">
-              <a:buNone/>
-            </a:pPr>
-            <a:endParaRPr lang="en-US" dirty="0"/>
-          </a:p>
-        </p:txBody>
-      </p:sp>
-      <p:pic>
-        <p:nvPicPr>
-          <p:cNvPr id="7" name="Picture 6"/>
-          <p:cNvPicPr>
-            <a:picLocks noChangeAspect="1"/>
-          </p:cNvPicPr>
-          <p:nvPr/>
-        </p:nvPicPr>
-        <p:blipFill>
-          <a:blip r:embed="rId2"/>
-          <a:stretch>
-            <a:fillRect/>
-          </a:stretch>
-        </p:blipFill>
-        <p:spPr>
-          <a:xfrm>
-            <a:off x="6162890" y="1527197"/>
-            <a:ext cx="4505110" cy="4598966"/>
-          </a:xfrm>
-          <a:prstGeom prst="rect">
-            <a:avLst/>
-          </a:prstGeom>
-        </p:spPr>
-      </p:pic>
-    </p:spTree>
-    <p:extLst>
-      <p:ext uri="{BB962C8B-B14F-4D97-AF65-F5344CB8AC3E}">
-        <p14:creationId xmlns:p14="http://schemas.microsoft.com/office/powerpoint/2010/main" val="1112317266"/>
-      </p:ext>
-    </p:extLst>
-  </p:cSld>
-  <p:clrMapOvr>
-    <a:masterClrMapping/>
-  </p:clrMapOvr>
-</p:sld>
-</file>
-
-<file path=ppt/slides/slide17.xml><?xml version="1.0" encoding="utf-8"?>
+<file path=ppt/slides/slide2.xml><?xml version="1.0" encoding="utf-8"?>
 <p:sld xmlns:a="http://schemas.openxmlformats.org/drawingml/2006/main" xmlns:r="http://schemas.openxmlformats.org/officeDocument/2006/relationships" xmlns:p="http://schemas.openxmlformats.org/presentationml/2006/main">
   <p:cSld>
     <p:spTree>
@@ -5200,406 +5907,6 @@
 </p:sld>
 </file>
 
-<file path=ppt/slides/slide18.xml><?xml version="1.0" encoding="utf-8"?>
-<p:sld xmlns:a="http://schemas.openxmlformats.org/drawingml/2006/main" xmlns:r="http://schemas.openxmlformats.org/officeDocument/2006/relationships" xmlns:p="http://schemas.openxmlformats.org/presentationml/2006/main">
-  <p:cSld>
-    <p:spTree>
-      <p:nvGrpSpPr>
-        <p:cNvPr id="1" name=""/>
-        <p:cNvGrpSpPr/>
-        <p:nvPr/>
-      </p:nvGrpSpPr>
-      <p:grpSpPr>
-        <a:xfrm>
-          <a:off x="0" y="0"/>
-          <a:ext cx="0" cy="0"/>
-          <a:chOff x="0" y="0"/>
-          <a:chExt cx="0" cy="0"/>
-        </a:xfrm>
-      </p:grpSpPr>
-      <p:sp>
-        <p:nvSpPr>
-          <p:cNvPr id="2" name="Title 1"/>
-          <p:cNvSpPr>
-            <a:spLocks noGrp="1"/>
-          </p:cNvSpPr>
-          <p:nvPr>
-            <p:ph type="title"/>
-          </p:nvPr>
-        </p:nvSpPr>
-        <p:spPr/>
-        <p:txBody>
-          <a:bodyPr/>
-          <a:lstStyle/>
-          <a:p>
-            <a:r>
-              <a:rPr lang="en-US" dirty="0"/>
-              <a:t>Maintaining Stability</a:t>
-            </a:r>
-          </a:p>
-        </p:txBody>
-      </p:sp>
-      <p:sp>
-        <p:nvSpPr>
-          <p:cNvPr id="3" name="Content Placeholder 2"/>
-          <p:cNvSpPr>
-            <a:spLocks noGrp="1"/>
-          </p:cNvSpPr>
-          <p:nvPr>
-            <p:ph idx="1"/>
-          </p:nvPr>
-        </p:nvSpPr>
-        <p:spPr/>
-        <p:txBody>
-          <a:bodyPr>
-            <a:normAutofit/>
-          </a:bodyPr>
-          <a:lstStyle/>
-          <a:p>
-            <a:r>
-              <a:rPr lang="en-US" dirty="0"/>
-              <a:t>Multi-rotor aircraft are inherently unstable</a:t>
-            </a:r>
-          </a:p>
-          <a:p>
-            <a:pPr lvl="1"/>
-            <a:r>
-              <a:rPr lang="en-US" dirty="0"/>
-              <a:t>Mismatched motor power (voltage variation, manufacturing variation in motors or props)</a:t>
-            </a:r>
-          </a:p>
-          <a:p>
-            <a:pPr lvl="1"/>
-            <a:r>
-              <a:rPr lang="en-US" dirty="0"/>
-              <a:t>Variation in air currents and density.</a:t>
-            </a:r>
-          </a:p>
-          <a:p>
-            <a:pPr lvl="1"/>
-            <a:r>
-              <a:rPr lang="en-US" dirty="0"/>
-              <a:t>Once perturbed, there’s no force acting on the aircraft to return it to equilibrium.</a:t>
-            </a:r>
-          </a:p>
-        </p:txBody>
-      </p:sp>
-    </p:spTree>
-    <p:extLst>
-      <p:ext uri="{BB962C8B-B14F-4D97-AF65-F5344CB8AC3E}">
-        <p14:creationId xmlns:p14="http://schemas.microsoft.com/office/powerpoint/2010/main" val="1491936377"/>
-      </p:ext>
-    </p:extLst>
-  </p:cSld>
-  <p:clrMapOvr>
-    <a:masterClrMapping/>
-  </p:clrMapOvr>
-</p:sld>
-</file>
-
-<file path=ppt/slides/slide19.xml><?xml version="1.0" encoding="utf-8"?>
-<p:sld xmlns:a="http://schemas.openxmlformats.org/drawingml/2006/main" xmlns:r="http://schemas.openxmlformats.org/officeDocument/2006/relationships" xmlns:p="http://schemas.openxmlformats.org/presentationml/2006/main">
-  <p:cSld>
-    <p:spTree>
-      <p:nvGrpSpPr>
-        <p:cNvPr id="1" name=""/>
-        <p:cNvGrpSpPr/>
-        <p:nvPr/>
-      </p:nvGrpSpPr>
-      <p:grpSpPr>
-        <a:xfrm>
-          <a:off x="0" y="0"/>
-          <a:ext cx="0" cy="0"/>
-          <a:chOff x="0" y="0"/>
-          <a:chExt cx="0" cy="0"/>
-        </a:xfrm>
-      </p:grpSpPr>
-      <p:sp>
-        <p:nvSpPr>
-          <p:cNvPr id="2" name="Title 1"/>
-          <p:cNvSpPr>
-            <a:spLocks noGrp="1"/>
-          </p:cNvSpPr>
-          <p:nvPr>
-            <p:ph type="title"/>
-          </p:nvPr>
-        </p:nvSpPr>
-        <p:spPr/>
-        <p:txBody>
-          <a:bodyPr/>
-          <a:lstStyle/>
-          <a:p>
-            <a:r>
-              <a:rPr lang="en-US" dirty="0"/>
-              <a:t>Maintaining Stability</a:t>
-            </a:r>
-          </a:p>
-        </p:txBody>
-      </p:sp>
-      <p:sp>
-        <p:nvSpPr>
-          <p:cNvPr id="3" name="Content Placeholder 2"/>
-          <p:cNvSpPr>
-            <a:spLocks noGrp="1"/>
-          </p:cNvSpPr>
-          <p:nvPr>
-            <p:ph idx="1"/>
-          </p:nvPr>
-        </p:nvSpPr>
-        <p:spPr/>
-        <p:txBody>
-          <a:bodyPr>
-            <a:normAutofit fontScale="92500" lnSpcReduction="10000"/>
-          </a:bodyPr>
-          <a:lstStyle/>
-          <a:p>
-            <a:r>
-              <a:rPr lang="en-US" dirty="0"/>
-              <a:t>Multi-rotor aircraft require a closed loop controller</a:t>
-            </a:r>
-          </a:p>
-          <a:p>
-            <a:pPr lvl="1"/>
-            <a:r>
-              <a:rPr lang="en-US" dirty="0"/>
-              <a:t>Sensors detect aircraft movement and orientation</a:t>
-            </a:r>
-          </a:p>
-          <a:p>
-            <a:pPr lvl="1"/>
-            <a:r>
-              <a:rPr lang="en-US" dirty="0"/>
-              <a:t>Controller adjusts the power to motors to maintain desired location and orientation</a:t>
-            </a:r>
-          </a:p>
-          <a:p>
-            <a:r>
-              <a:rPr lang="en-US" dirty="0"/>
-              <a:t>Multi-rotor aircraft use a few sensors to maintain stability</a:t>
-            </a:r>
-          </a:p>
-          <a:p>
-            <a:pPr lvl="1"/>
-            <a:r>
-              <a:rPr lang="en-US" dirty="0"/>
-              <a:t>Accelerometers (absolute pitch and roll)</a:t>
-            </a:r>
-          </a:p>
-          <a:p>
-            <a:pPr lvl="1"/>
-            <a:r>
-              <a:rPr lang="en-US" dirty="0"/>
-              <a:t>Gyroscopes (changes in pitch, roll, and yaw)</a:t>
-            </a:r>
-          </a:p>
-          <a:p>
-            <a:r>
-              <a:rPr lang="en-US" dirty="0"/>
-              <a:t>The flight computer implements the control algorithm</a:t>
-            </a:r>
-          </a:p>
-          <a:p>
-            <a:pPr lvl="1"/>
-            <a:r>
-              <a:rPr lang="en-US" dirty="0"/>
-              <a:t>Usually a </a:t>
-            </a:r>
-            <a:r>
-              <a:rPr lang="en-US" i="1" dirty="0"/>
-              <a:t>proportional, integral, derivative (PID)</a:t>
-            </a:r>
-            <a:r>
-              <a:rPr lang="en-US" dirty="0"/>
-              <a:t> controller implemented in software.</a:t>
-            </a:r>
-          </a:p>
-          <a:p>
-            <a:pPr lvl="1"/>
-            <a:r>
-              <a:rPr lang="en-US" dirty="0"/>
-              <a:t>We will talk more about this later.</a:t>
-            </a:r>
-          </a:p>
-          <a:p>
-            <a:r>
-              <a:rPr lang="en-US" dirty="0"/>
-              <a:t>With PID controllers for pitch, yaw, and roll </a:t>
-            </a:r>
-            <a:r>
-              <a:rPr lang="en-US" dirty="0" err="1"/>
-              <a:t>multirotor</a:t>
-            </a:r>
-            <a:r>
-              <a:rPr lang="en-US" dirty="0"/>
-              <a:t> aircraft can achieve stable flight.</a:t>
-            </a:r>
-          </a:p>
-        </p:txBody>
-      </p:sp>
-    </p:spTree>
-    <p:extLst>
-      <p:ext uri="{BB962C8B-B14F-4D97-AF65-F5344CB8AC3E}">
-        <p14:creationId xmlns:p14="http://schemas.microsoft.com/office/powerpoint/2010/main" val="1513451432"/>
-      </p:ext>
-    </p:extLst>
-  </p:cSld>
-  <p:clrMapOvr>
-    <a:masterClrMapping/>
-  </p:clrMapOvr>
-</p:sld>
-</file>
-
-<file path=ppt/slides/slide2.xml><?xml version="1.0" encoding="utf-8"?>
-<p:sld xmlns:a="http://schemas.openxmlformats.org/drawingml/2006/main" xmlns:r="http://schemas.openxmlformats.org/officeDocument/2006/relationships" xmlns:p="http://schemas.openxmlformats.org/presentationml/2006/main">
-  <p:cSld>
-    <p:spTree>
-      <p:nvGrpSpPr>
-        <p:cNvPr id="1" name=""/>
-        <p:cNvGrpSpPr/>
-        <p:nvPr/>
-      </p:nvGrpSpPr>
-      <p:grpSpPr>
-        <a:xfrm>
-          <a:off x="0" y="0"/>
-          <a:ext cx="0" cy="0"/>
-          <a:chOff x="0" y="0"/>
-          <a:chExt cx="0" cy="0"/>
-        </a:xfrm>
-      </p:grpSpPr>
-      <p:sp>
-        <p:nvSpPr>
-          <p:cNvPr id="2" name="Title 1"/>
-          <p:cNvSpPr>
-            <a:spLocks noGrp="1"/>
-          </p:cNvSpPr>
-          <p:nvPr>
-            <p:ph type="title"/>
-          </p:nvPr>
-        </p:nvSpPr>
-        <p:spPr/>
-        <p:txBody>
-          <a:bodyPr/>
-          <a:lstStyle/>
-          <a:p>
-            <a:r>
-              <a:rPr lang="en-US" dirty="0"/>
-              <a:t>To add</a:t>
-            </a:r>
-          </a:p>
-        </p:txBody>
-      </p:sp>
-      <p:sp>
-        <p:nvSpPr>
-          <p:cNvPr id="3" name="Content Placeholder 2"/>
-          <p:cNvSpPr>
-            <a:spLocks noGrp="1"/>
-          </p:cNvSpPr>
-          <p:nvPr>
-            <p:ph idx="1"/>
-          </p:nvPr>
-        </p:nvSpPr>
-        <p:spPr/>
-        <p:txBody>
-          <a:bodyPr>
-            <a:normAutofit lnSpcReduction="10000"/>
-          </a:bodyPr>
-          <a:lstStyle/>
-          <a:p>
-            <a:r>
-              <a:rPr lang="en-US" dirty="0"/>
-              <a:t>Discuss different ways they can control their quad</a:t>
-            </a:r>
-          </a:p>
-          <a:p>
-            <a:pPr lvl="1"/>
-            <a:r>
-              <a:rPr lang="en-US" dirty="0"/>
-              <a:t>Pitch/roll -&gt; rate of change of angle</a:t>
-            </a:r>
-          </a:p>
-          <a:p>
-            <a:pPr lvl="1"/>
-            <a:r>
-              <a:rPr lang="en-US" dirty="0"/>
-              <a:t>Pitch/roll -&gt; angle of attack</a:t>
-            </a:r>
-          </a:p>
-          <a:p>
-            <a:pPr lvl="1"/>
-            <a:r>
-              <a:rPr lang="en-US" dirty="0"/>
-              <a:t>Pitch/roll -&gt; velocity</a:t>
-            </a:r>
-          </a:p>
-          <a:p>
-            <a:pPr lvl="1"/>
-            <a:r>
-              <a:rPr lang="en-US" dirty="0"/>
-              <a:t>Pitch/roll -&gt; position</a:t>
-            </a:r>
-          </a:p>
-          <a:p>
-            <a:pPr lvl="1"/>
-            <a:r>
-              <a:rPr lang="en-US" dirty="0"/>
-              <a:t>Throttle -&gt; throttle</a:t>
-            </a:r>
-          </a:p>
-          <a:p>
-            <a:pPr lvl="1"/>
-            <a:r>
-              <a:rPr lang="en-US" dirty="0"/>
-              <a:t>Throttle -&gt; rate of climb</a:t>
-            </a:r>
-          </a:p>
-          <a:p>
-            <a:pPr lvl="1"/>
-            <a:r>
-              <a:rPr lang="en-US" dirty="0"/>
-              <a:t>Throttle -&gt; altitude</a:t>
-            </a:r>
-          </a:p>
-          <a:p>
-            <a:r>
-              <a:rPr lang="en-US" dirty="0"/>
-              <a:t>Discuss higher-order control</a:t>
-            </a:r>
-          </a:p>
-          <a:p>
-            <a:pPr lvl="1"/>
-            <a:r>
-              <a:rPr lang="en-US" dirty="0"/>
-              <a:t>How to integrate GPS</a:t>
-            </a:r>
-          </a:p>
-          <a:p>
-            <a:pPr lvl="1"/>
-            <a:r>
-              <a:rPr lang="en-US" dirty="0"/>
-              <a:t>How to integrate barometer</a:t>
-            </a:r>
-          </a:p>
-          <a:p>
-            <a:endParaRPr lang="en-US" dirty="0"/>
-          </a:p>
-          <a:p>
-            <a:endParaRPr lang="en-US" dirty="0"/>
-          </a:p>
-        </p:txBody>
-      </p:sp>
-    </p:spTree>
-    <p:extLst>
-      <p:ext uri="{BB962C8B-B14F-4D97-AF65-F5344CB8AC3E}">
-        <p14:creationId xmlns:p14="http://schemas.microsoft.com/office/powerpoint/2010/main" val="1497643557"/>
-      </p:ext>
-    </p:extLst>
-  </p:cSld>
-  <p:clrMapOvr>
-    <a:masterClrMapping/>
-  </p:clrMapOvr>
-</p:sld>
-</file>
-
 <file path=ppt/slides/slide20.xml><?xml version="1.0" encoding="utf-8"?>
 <p:sld xmlns:a="http://schemas.openxmlformats.org/drawingml/2006/main" xmlns:r="http://schemas.openxmlformats.org/officeDocument/2006/relationships" xmlns:p="http://schemas.openxmlformats.org/presentationml/2006/main">
   <p:cSld>
@@ -5634,7 +5941,7 @@
           <a:p>
             <a:r>
               <a:rPr lang="en-US" dirty="0"/>
-              <a:t>Higher-order Navigation</a:t>
+              <a:t>Controlling Yaw</a:t>
             </a:r>
           </a:p>
         </p:txBody>
@@ -5656,55 +5963,41 @@
           <a:p>
             <a:r>
               <a:rPr lang="en-US" dirty="0"/>
-              <a:t>Large multi-rotor aircraft can do more</a:t>
+              <a:t>Rotate CCW</a:t>
             </a:r>
           </a:p>
           <a:p>
             <a:pPr lvl="1"/>
             <a:r>
               <a:rPr lang="en-US" dirty="0"/>
-              <a:t>Maintain geographic position</a:t>
+              <a:t>More thrust to the CCW motors</a:t>
             </a:r>
           </a:p>
           <a:p>
             <a:pPr lvl="1"/>
             <a:r>
               <a:rPr lang="en-US" dirty="0"/>
-              <a:t>Maintain altitude</a:t>
+              <a:t>Less to the CW</a:t>
+            </a:r>
+          </a:p>
+          <a:p>
+            <a:r>
+              <a:rPr lang="en-US" dirty="0"/>
+              <a:t>Rotate CW</a:t>
             </a:r>
           </a:p>
           <a:p>
             <a:pPr lvl="1"/>
             <a:r>
               <a:rPr lang="en-US" dirty="0"/>
-              <a:t>Follow an prescribed/pre-programmed path</a:t>
-            </a:r>
-          </a:p>
-          <a:p>
-            <a:r>
-              <a:rPr lang="en-US" dirty="0"/>
-              <a:t>More sensors required</a:t>
+              <a:t>More thrust CW motors</a:t>
             </a:r>
           </a:p>
           <a:p>
             <a:pPr lvl="1"/>
             <a:r>
               <a:rPr lang="en-US" dirty="0"/>
-              <a:t>Magnetometers (absolute yaw or heading)</a:t>
-            </a:r>
-          </a:p>
-          <a:p>
-            <a:pPr lvl="1"/>
-            <a:r>
-              <a:rPr lang="en-US" dirty="0"/>
-              <a:t>GPS (absolute location and altitude)</a:t>
-            </a:r>
-          </a:p>
-          <a:p>
-            <a:pPr lvl="1"/>
-            <a:r>
-              <a:rPr lang="en-US" dirty="0"/>
-              <a:t>Barometers (altitude)</a:t>
+              <a:t>Less to the CCW</a:t>
             </a:r>
           </a:p>
           <a:p>
@@ -5712,10 +6005,34 @@
           </a:p>
         </p:txBody>
       </p:sp>
+      <p:pic>
+        <p:nvPicPr>
+          <p:cNvPr id="7" name="Picture 6"/>
+          <p:cNvPicPr>
+            <a:picLocks noChangeAspect="1"/>
+          </p:cNvPicPr>
+          <p:nvPr/>
+        </p:nvPicPr>
+        <p:blipFill>
+          <a:blip r:embed="rId2"/>
+          <a:stretch>
+            <a:fillRect/>
+          </a:stretch>
+        </p:blipFill>
+        <p:spPr>
+          <a:xfrm>
+            <a:off x="6162890" y="1527197"/>
+            <a:ext cx="4505110" cy="4598966"/>
+          </a:xfrm>
+          <a:prstGeom prst="rect">
+            <a:avLst/>
+          </a:prstGeom>
+        </p:spPr>
+      </p:pic>
     </p:spTree>
     <p:extLst>
       <p:ext uri="{BB962C8B-B14F-4D97-AF65-F5344CB8AC3E}">
-        <p14:creationId xmlns:p14="http://schemas.microsoft.com/office/powerpoint/2010/main" val="1320941916"/>
+        <p14:creationId xmlns:p14="http://schemas.microsoft.com/office/powerpoint/2010/main" val="1112317266"/>
       </p:ext>
     </p:extLst>
   </p:cSld>
@@ -5744,7 +6061,7 @@
       </p:grpSpPr>
       <p:sp>
         <p:nvSpPr>
-          <p:cNvPr id="4" name="Title 3"/>
+          <p:cNvPr id="2" name="Title 1"/>
           <p:cNvSpPr>
             <a:spLocks noGrp="1"/>
           </p:cNvSpPr>
@@ -5759,14 +6076,14 @@
           <a:p>
             <a:r>
               <a:rPr lang="en-US" dirty="0"/>
-              <a:t>Note for Next Class</a:t>
-            </a:r>
-          </a:p>
-        </p:txBody>
-      </p:sp>
-      <p:sp>
-        <p:nvSpPr>
-          <p:cNvPr id="5" name="Text Placeholder 4"/>
+              <a:t>Maintaining Stability</a:t>
+            </a:r>
+          </a:p>
+        </p:txBody>
+      </p:sp>
+      <p:sp>
+        <p:nvSpPr>
+          <p:cNvPr id="3" name="Content Placeholder 2"/>
           <p:cNvSpPr>
             <a:spLocks noGrp="1"/>
           </p:cNvSpPr>
@@ -5776,93 +6093,41 @@
         </p:nvSpPr>
         <p:spPr/>
         <p:txBody>
-          <a:bodyPr numCol="3">
-            <a:normAutofit/>
-          </a:bodyPr>
-          <a:lstStyle/>
-          <a:p>
-            <a:r>
-              <a:rPr lang="en-US" dirty="0"/>
-              <a:t>Demo</a:t>
+          <a:bodyPr/>
+          <a:lstStyle/>
+          <a:p>
+            <a:r>
+              <a:rPr lang="en-US" dirty="0"/>
+              <a:t>Multi-rotor aircraft are inherently unstable</a:t>
             </a:r>
           </a:p>
           <a:p>
             <a:pPr lvl="1"/>
             <a:r>
               <a:rPr lang="en-US" dirty="0"/>
-              <a:t>Noise</a:t>
+              <a:t>Mismatched motor power (voltage variation, manufacturing variation in motors or props)</a:t>
             </a:r>
           </a:p>
           <a:p>
             <a:pPr lvl="1"/>
             <a:r>
               <a:rPr lang="en-US" dirty="0"/>
-              <a:t>Noise reduction</a:t>
+              <a:t>Variation in air currents and density.</a:t>
             </a:r>
           </a:p>
           <a:p>
             <a:pPr lvl="1"/>
             <a:r>
               <a:rPr lang="en-US" dirty="0"/>
-              <a:t>Complimentary filter.</a:t>
-            </a:r>
-          </a:p>
-          <a:p>
-            <a:pPr lvl="1"/>
-            <a:r>
-              <a:rPr lang="en-US" dirty="0"/>
-              <a:t>Integral windup</a:t>
-            </a:r>
-          </a:p>
-          <a:p>
-            <a:pPr lvl="1"/>
-            <a:r>
-              <a:rPr lang="en-US" dirty="0"/>
-              <a:t>Tuning PID</a:t>
-            </a:r>
-          </a:p>
-          <a:p>
-            <a:r>
-              <a:rPr lang="en-US" dirty="0"/>
-              <a:t>Control registers for IMU</a:t>
-            </a:r>
-          </a:p>
-          <a:p>
-            <a:pPr lvl="1"/>
-            <a:r>
-              <a:rPr lang="en-US" dirty="0"/>
-              <a:t>Register maps</a:t>
-            </a:r>
-          </a:p>
-          <a:p>
-            <a:pPr lvl="1"/>
-            <a:r>
-              <a:rPr lang="en-US" dirty="0"/>
-              <a:t>Writing registers</a:t>
-            </a:r>
-          </a:p>
-          <a:p>
-            <a:pPr lvl="1"/>
-            <a:r>
-              <a:rPr lang="en-US" dirty="0"/>
-              <a:t>Relationship between registers and circuit schematics of IMU internals</a:t>
-            </a:r>
-          </a:p>
-          <a:p>
-            <a:r>
-              <a:rPr lang="en-US" dirty="0"/>
-              <a:t>Combine this lecture with the flight control software lecture</a:t>
-            </a:r>
-          </a:p>
-          <a:p>
-            <a:endParaRPr lang="en-US" dirty="0"/>
+              <a:t>Once perturbed, there’s no force acting on the aircraft to return it to equilibrium.</a:t>
+            </a:r>
           </a:p>
         </p:txBody>
       </p:sp>
     </p:spTree>
     <p:extLst>
       <p:ext uri="{BB962C8B-B14F-4D97-AF65-F5344CB8AC3E}">
-        <p14:creationId xmlns:p14="http://schemas.microsoft.com/office/powerpoint/2010/main" val="2791645037"/>
+        <p14:creationId xmlns:p14="http://schemas.microsoft.com/office/powerpoint/2010/main" val="1491936377"/>
       </p:ext>
     </p:extLst>
   </p:cSld>
@@ -5891,7 +6156,7 @@
       </p:grpSpPr>
       <p:sp>
         <p:nvSpPr>
-          <p:cNvPr id="42" name="Shape 42"/>
+          <p:cNvPr id="2" name="Title 1"/>
           <p:cNvSpPr>
             <a:spLocks noGrp="1"/>
           </p:cNvSpPr>
@@ -5899,26 +6164,585 @@
             <p:ph type="title"/>
           </p:nvPr>
         </p:nvSpPr>
-        <p:spPr>
-          <a:prstGeom prst="rect">
-            <a:avLst/>
-          </a:prstGeom>
-        </p:spPr>
+        <p:spPr/>
+        <p:txBody>
+          <a:bodyPr/>
+          <a:lstStyle/>
+          <a:p>
+            <a:r>
+              <a:rPr lang="en-US" dirty="0"/>
+              <a:t>Maintaining Stability</a:t>
+            </a:r>
+          </a:p>
+        </p:txBody>
+      </p:sp>
+      <p:sp>
+        <p:nvSpPr>
+          <p:cNvPr id="3" name="Content Placeholder 2"/>
+          <p:cNvSpPr>
+            <a:spLocks noGrp="1"/>
+          </p:cNvSpPr>
+          <p:nvPr>
+            <p:ph idx="1"/>
+          </p:nvPr>
+        </p:nvSpPr>
+        <p:spPr/>
         <p:txBody>
           <a:bodyPr>
+            <a:normAutofit fontScale="92500" lnSpcReduction="10000"/>
+          </a:bodyPr>
+          <a:lstStyle/>
+          <a:p>
+            <a:r>
+              <a:rPr lang="en-US" dirty="0"/>
+              <a:t>Multi-rotor aircraft require a closed loop controller</a:t>
+            </a:r>
+          </a:p>
+          <a:p>
+            <a:pPr lvl="1"/>
+            <a:r>
+              <a:rPr lang="en-US" dirty="0"/>
+              <a:t>Sensors detect aircraft movement and orientation</a:t>
+            </a:r>
+          </a:p>
+          <a:p>
+            <a:pPr lvl="1"/>
+            <a:r>
+              <a:rPr lang="en-US" dirty="0"/>
+              <a:t>Controller adjusts the power to motors to maintain desired location and orientation</a:t>
+            </a:r>
+          </a:p>
+          <a:p>
+            <a:r>
+              <a:rPr lang="en-US" dirty="0"/>
+              <a:t>Multi-rotor aircraft use a few sensors to maintain stability</a:t>
+            </a:r>
+          </a:p>
+          <a:p>
+            <a:pPr lvl="1"/>
+            <a:r>
+              <a:rPr lang="en-US" dirty="0"/>
+              <a:t>Accelerometers (absolute pitch and roll)</a:t>
+            </a:r>
+          </a:p>
+          <a:p>
+            <a:pPr lvl="1"/>
+            <a:r>
+              <a:rPr lang="en-US" dirty="0"/>
+              <a:t>Gyroscopes (changes in pitch, roll, and yaw)</a:t>
+            </a:r>
+          </a:p>
+          <a:p>
+            <a:r>
+              <a:rPr lang="en-US" dirty="0"/>
+              <a:t>The flight computer implements the control algorithm</a:t>
+            </a:r>
+          </a:p>
+          <a:p>
+            <a:pPr lvl="1"/>
+            <a:r>
+              <a:rPr lang="en-US" dirty="0"/>
+              <a:t>Usually a proportional, integral, derivative (PID) controller implemented in software.</a:t>
+            </a:r>
+          </a:p>
+          <a:p>
+            <a:pPr lvl="1"/>
+            <a:r>
+              <a:rPr lang="en-US" dirty="0"/>
+              <a:t>We will talk more about this later.</a:t>
+            </a:r>
+          </a:p>
+          <a:p>
+            <a:r>
+              <a:rPr lang="en-US" dirty="0"/>
+              <a:t>With PID controllers for pitch, yaw, and roll </a:t>
+            </a:r>
+            <a:r>
+              <a:rPr lang="en-US" dirty="0" err="1"/>
+              <a:t>multirotor</a:t>
+            </a:r>
+            <a:r>
+              <a:rPr lang="en-US" dirty="0"/>
+              <a:t> aircraft can achieve stable flight.</a:t>
+            </a:r>
+          </a:p>
+        </p:txBody>
+      </p:sp>
+    </p:spTree>
+    <p:extLst>
+      <p:ext uri="{BB962C8B-B14F-4D97-AF65-F5344CB8AC3E}">
+        <p14:creationId xmlns:p14="http://schemas.microsoft.com/office/powerpoint/2010/main" val="1513451432"/>
+      </p:ext>
+    </p:extLst>
+  </p:cSld>
+  <p:clrMapOvr>
+    <a:masterClrMapping/>
+  </p:clrMapOvr>
+</p:sld>
+</file>
+
+<file path=ppt/slides/slide5.xml><?xml version="1.0" encoding="utf-8"?>
+<p:sld xmlns:a="http://schemas.openxmlformats.org/drawingml/2006/main" xmlns:r="http://schemas.openxmlformats.org/officeDocument/2006/relationships" xmlns:p="http://schemas.openxmlformats.org/presentationml/2006/main">
+  <p:cSld>
+    <p:spTree>
+      <p:nvGrpSpPr>
+        <p:cNvPr id="1" name=""/>
+        <p:cNvGrpSpPr/>
+        <p:nvPr/>
+      </p:nvGrpSpPr>
+      <p:grpSpPr>
+        <a:xfrm>
+          <a:off x="0" y="0"/>
+          <a:ext cx="0" cy="0"/>
+          <a:chOff x="0" y="0"/>
+          <a:chExt cx="0" cy="0"/>
+        </a:xfrm>
+      </p:grpSpPr>
+      <p:sp>
+        <p:nvSpPr>
+          <p:cNvPr id="2" name="Title 1"/>
+          <p:cNvSpPr>
+            <a:spLocks noGrp="1"/>
+          </p:cNvSpPr>
+          <p:nvPr>
+            <p:ph type="title"/>
+          </p:nvPr>
+        </p:nvSpPr>
+        <p:spPr/>
+        <p:txBody>
+          <a:bodyPr/>
+          <a:lstStyle/>
+          <a:p>
+            <a:r>
+              <a:rPr lang="en-US" dirty="0"/>
+              <a:t>Higher-order Navigation</a:t>
+            </a:r>
+          </a:p>
+        </p:txBody>
+      </p:sp>
+      <p:sp>
+        <p:nvSpPr>
+          <p:cNvPr id="3" name="Content Placeholder 2"/>
+          <p:cNvSpPr>
+            <a:spLocks noGrp="1"/>
+          </p:cNvSpPr>
+          <p:nvPr>
+            <p:ph idx="1"/>
+          </p:nvPr>
+        </p:nvSpPr>
+        <p:spPr/>
+        <p:txBody>
+          <a:bodyPr/>
+          <a:lstStyle/>
+          <a:p>
+            <a:r>
+              <a:rPr lang="en-US" dirty="0"/>
+              <a:t>Large multi-rotor aircraft can do more</a:t>
+            </a:r>
+          </a:p>
+          <a:p>
+            <a:pPr lvl="1"/>
+            <a:r>
+              <a:rPr lang="en-US" dirty="0"/>
+              <a:t>Maintain geographic position</a:t>
+            </a:r>
+          </a:p>
+          <a:p>
+            <a:pPr lvl="1"/>
+            <a:r>
+              <a:rPr lang="en-US" dirty="0"/>
+              <a:t>Maintain altitude</a:t>
+            </a:r>
+          </a:p>
+          <a:p>
+            <a:pPr lvl="1"/>
+            <a:r>
+              <a:rPr lang="en-US" dirty="0"/>
+              <a:t>Follow an prescribed/pre-programmed path</a:t>
+            </a:r>
+          </a:p>
+          <a:p>
+            <a:r>
+              <a:rPr lang="en-US" dirty="0"/>
+              <a:t>More sensors required</a:t>
+            </a:r>
+          </a:p>
+          <a:p>
+            <a:pPr lvl="1"/>
+            <a:r>
+              <a:rPr lang="en-US" dirty="0"/>
+              <a:t>Magnetometers (absolute yaw or heading)</a:t>
+            </a:r>
+          </a:p>
+          <a:p>
+            <a:pPr lvl="1"/>
+            <a:r>
+              <a:rPr lang="en-US" dirty="0"/>
+              <a:t>GPS (absolute location and altitude)</a:t>
+            </a:r>
+          </a:p>
+          <a:p>
+            <a:pPr lvl="1"/>
+            <a:r>
+              <a:rPr lang="en-US" dirty="0"/>
+              <a:t>Barometers (altitude)</a:t>
+            </a:r>
+          </a:p>
+          <a:p>
+            <a:endParaRPr lang="en-US" dirty="0"/>
+          </a:p>
+        </p:txBody>
+      </p:sp>
+    </p:spTree>
+    <p:extLst>
+      <p:ext uri="{BB962C8B-B14F-4D97-AF65-F5344CB8AC3E}">
+        <p14:creationId xmlns:p14="http://schemas.microsoft.com/office/powerpoint/2010/main" val="1320941916"/>
+      </p:ext>
+    </p:extLst>
+  </p:cSld>
+  <p:clrMapOvr>
+    <a:masterClrMapping/>
+  </p:clrMapOvr>
+</p:sld>
+</file>
+
+<file path=ppt/slides/slide6.xml><?xml version="1.0" encoding="utf-8"?>
+<p:sld xmlns:a="http://schemas.openxmlformats.org/drawingml/2006/main" xmlns:r="http://schemas.openxmlformats.org/officeDocument/2006/relationships" xmlns:p="http://schemas.openxmlformats.org/presentationml/2006/main" show="0">
+  <p:cSld>
+    <p:spTree>
+      <p:nvGrpSpPr>
+        <p:cNvPr id="1" name=""/>
+        <p:cNvGrpSpPr/>
+        <p:nvPr/>
+      </p:nvGrpSpPr>
+      <p:grpSpPr>
+        <a:xfrm>
+          <a:off x="0" y="0"/>
+          <a:ext cx="0" cy="0"/>
+          <a:chOff x="0" y="0"/>
+          <a:chExt cx="0" cy="0"/>
+        </a:xfrm>
+      </p:grpSpPr>
+      <p:sp>
+        <p:nvSpPr>
+          <p:cNvPr id="2" name="Title 1"/>
+          <p:cNvSpPr>
+            <a:spLocks noGrp="1"/>
+          </p:cNvSpPr>
+          <p:nvPr>
+            <p:ph type="title"/>
+          </p:nvPr>
+        </p:nvSpPr>
+        <p:spPr/>
+        <p:txBody>
+          <a:bodyPr/>
+          <a:lstStyle/>
+          <a:p>
+            <a:r>
+              <a:rPr lang="en-US" dirty="0"/>
+              <a:t>To add</a:t>
+            </a:r>
+          </a:p>
+        </p:txBody>
+      </p:sp>
+      <p:sp>
+        <p:nvSpPr>
+          <p:cNvPr id="3" name="Content Placeholder 2"/>
+          <p:cNvSpPr>
+            <a:spLocks noGrp="1"/>
+          </p:cNvSpPr>
+          <p:nvPr>
+            <p:ph idx="1"/>
+          </p:nvPr>
+        </p:nvSpPr>
+        <p:spPr/>
+        <p:txBody>
+          <a:bodyPr>
+            <a:normAutofit lnSpcReduction="10000"/>
+          </a:bodyPr>
+          <a:lstStyle/>
+          <a:p>
+            <a:r>
+              <a:rPr lang="en-US" dirty="0"/>
+              <a:t>Discuss different ways they can control their quad</a:t>
+            </a:r>
+          </a:p>
+          <a:p>
+            <a:pPr lvl="1"/>
+            <a:r>
+              <a:rPr lang="en-US" dirty="0"/>
+              <a:t>Pitch/roll -&gt; rate of change of angle</a:t>
+            </a:r>
+          </a:p>
+          <a:p>
+            <a:pPr lvl="1"/>
+            <a:r>
+              <a:rPr lang="en-US" dirty="0"/>
+              <a:t>Pitch/roll -&gt; angle of attack</a:t>
+            </a:r>
+          </a:p>
+          <a:p>
+            <a:pPr lvl="1"/>
+            <a:r>
+              <a:rPr lang="en-US" dirty="0"/>
+              <a:t>Pitch/roll -&gt; velocity</a:t>
+            </a:r>
+          </a:p>
+          <a:p>
+            <a:pPr lvl="1"/>
+            <a:r>
+              <a:rPr lang="en-US" dirty="0"/>
+              <a:t>Pitch/roll -&gt; position</a:t>
+            </a:r>
+          </a:p>
+          <a:p>
+            <a:pPr lvl="1"/>
+            <a:r>
+              <a:rPr lang="en-US" dirty="0"/>
+              <a:t>Throttle -&gt; throttle</a:t>
+            </a:r>
+          </a:p>
+          <a:p>
+            <a:pPr lvl="1"/>
+            <a:r>
+              <a:rPr lang="en-US" dirty="0"/>
+              <a:t>Throttle -&gt; rate of climb</a:t>
+            </a:r>
+          </a:p>
+          <a:p>
+            <a:pPr lvl="1"/>
+            <a:r>
+              <a:rPr lang="en-US" dirty="0"/>
+              <a:t>Throttle -&gt; altitude</a:t>
+            </a:r>
+          </a:p>
+          <a:p>
+            <a:r>
+              <a:rPr lang="en-US" dirty="0"/>
+              <a:t>Discuss higher-order control</a:t>
+            </a:r>
+          </a:p>
+          <a:p>
+            <a:pPr lvl="1"/>
+            <a:r>
+              <a:rPr lang="en-US" dirty="0"/>
+              <a:t>How to integrate GPS</a:t>
+            </a:r>
+          </a:p>
+          <a:p>
+            <a:pPr lvl="1"/>
+            <a:r>
+              <a:rPr lang="en-US" dirty="0"/>
+              <a:t>How to integrate barometer</a:t>
+            </a:r>
+          </a:p>
+          <a:p>
+            <a:endParaRPr lang="en-US" dirty="0"/>
+          </a:p>
+          <a:p>
+            <a:endParaRPr lang="en-US" dirty="0"/>
+          </a:p>
+        </p:txBody>
+      </p:sp>
+    </p:spTree>
+    <p:extLst>
+      <p:ext uri="{BB962C8B-B14F-4D97-AF65-F5344CB8AC3E}">
+        <p14:creationId xmlns:p14="http://schemas.microsoft.com/office/powerpoint/2010/main" val="1497643557"/>
+      </p:ext>
+    </p:extLst>
+  </p:cSld>
+  <p:clrMapOvr>
+    <a:masterClrMapping/>
+  </p:clrMapOvr>
+</p:sld>
+</file>
+
+<file path=ppt/slides/slide7.xml><?xml version="1.0" encoding="utf-8"?>
+<p:sld xmlns:a="http://schemas.openxmlformats.org/drawingml/2006/main" xmlns:r="http://schemas.openxmlformats.org/officeDocument/2006/relationships" xmlns:p="http://schemas.openxmlformats.org/presentationml/2006/main" show="0">
+  <p:cSld>
+    <p:spTree>
+      <p:nvGrpSpPr>
+        <p:cNvPr id="1" name=""/>
+        <p:cNvGrpSpPr/>
+        <p:nvPr/>
+      </p:nvGrpSpPr>
+      <p:grpSpPr>
+        <a:xfrm>
+          <a:off x="0" y="0"/>
+          <a:ext cx="0" cy="0"/>
+          <a:chOff x="0" y="0"/>
+          <a:chExt cx="0" cy="0"/>
+        </a:xfrm>
+      </p:grpSpPr>
+      <p:sp>
+        <p:nvSpPr>
+          <p:cNvPr id="4" name="Title 3"/>
+          <p:cNvSpPr>
+            <a:spLocks noGrp="1"/>
+          </p:cNvSpPr>
+          <p:nvPr>
+            <p:ph type="title"/>
+          </p:nvPr>
+        </p:nvSpPr>
+        <p:spPr/>
+        <p:txBody>
+          <a:bodyPr/>
+          <a:lstStyle/>
+          <a:p>
+            <a:r>
+              <a:rPr lang="en-US" dirty="0"/>
+              <a:t>Note for Next Class</a:t>
+            </a:r>
+          </a:p>
+        </p:txBody>
+      </p:sp>
+      <p:sp>
+        <p:nvSpPr>
+          <p:cNvPr id="5" name="Text Placeholder 4"/>
+          <p:cNvSpPr>
+            <a:spLocks noGrp="1"/>
+          </p:cNvSpPr>
+          <p:nvPr>
+            <p:ph idx="1"/>
+          </p:nvPr>
+        </p:nvSpPr>
+        <p:spPr/>
+        <p:txBody>
+          <a:bodyPr numCol="3">
             <a:normAutofit/>
           </a:bodyPr>
+          <a:lstStyle/>
+          <a:p>
+            <a:r>
+              <a:rPr lang="en-US" dirty="0"/>
+              <a:t>Demo</a:t>
+            </a:r>
+          </a:p>
+          <a:p>
+            <a:pPr lvl="1"/>
+            <a:r>
+              <a:rPr lang="en-US" dirty="0"/>
+              <a:t>Noise</a:t>
+            </a:r>
+          </a:p>
+          <a:p>
+            <a:pPr lvl="1"/>
+            <a:r>
+              <a:rPr lang="en-US" dirty="0"/>
+              <a:t>Noise reduction</a:t>
+            </a:r>
+          </a:p>
+          <a:p>
+            <a:pPr lvl="1"/>
+            <a:r>
+              <a:rPr lang="en-US" dirty="0"/>
+              <a:t>Complimentary filter.</a:t>
+            </a:r>
+          </a:p>
+          <a:p>
+            <a:pPr lvl="1"/>
+            <a:r>
+              <a:rPr lang="en-US" dirty="0"/>
+              <a:t>Integral windup</a:t>
+            </a:r>
+          </a:p>
+          <a:p>
+            <a:pPr lvl="1"/>
+            <a:r>
+              <a:rPr lang="en-US" dirty="0"/>
+              <a:t>Tuning PID</a:t>
+            </a:r>
+          </a:p>
+          <a:p>
+            <a:r>
+              <a:rPr lang="en-US" dirty="0"/>
+              <a:t>Control registers for IMU</a:t>
+            </a:r>
+          </a:p>
+          <a:p>
+            <a:pPr lvl="1"/>
+            <a:r>
+              <a:rPr lang="en-US" dirty="0"/>
+              <a:t>Register maps</a:t>
+            </a:r>
+          </a:p>
+          <a:p>
+            <a:pPr lvl="1"/>
+            <a:r>
+              <a:rPr lang="en-US" dirty="0"/>
+              <a:t>Writing registers</a:t>
+            </a:r>
+          </a:p>
+          <a:p>
+            <a:pPr lvl="1"/>
+            <a:r>
+              <a:rPr lang="en-US" dirty="0"/>
+              <a:t>Relationship between registers and circuit schematics of IMU internals</a:t>
+            </a:r>
+          </a:p>
+          <a:p>
+            <a:r>
+              <a:rPr lang="en-US" dirty="0"/>
+              <a:t>Combine this lecture with the flight control software lecture</a:t>
+            </a:r>
+          </a:p>
+          <a:p>
+            <a:endParaRPr lang="en-US" dirty="0"/>
+          </a:p>
+        </p:txBody>
+      </p:sp>
+    </p:spTree>
+    <p:extLst>
+      <p:ext uri="{BB962C8B-B14F-4D97-AF65-F5344CB8AC3E}">
+        <p14:creationId xmlns:p14="http://schemas.microsoft.com/office/powerpoint/2010/main" val="2791645037"/>
+      </p:ext>
+    </p:extLst>
+  </p:cSld>
+  <p:clrMapOvr>
+    <a:masterClrMapping/>
+  </p:clrMapOvr>
+</p:sld>
+</file>
+
+<file path=ppt/slides/slide8.xml><?xml version="1.0" encoding="utf-8"?>
+<p:sld xmlns:a="http://schemas.openxmlformats.org/drawingml/2006/main" xmlns:r="http://schemas.openxmlformats.org/officeDocument/2006/relationships" xmlns:p="http://schemas.openxmlformats.org/presentationml/2006/main">
+  <p:cSld>
+    <p:spTree>
+      <p:nvGrpSpPr>
+        <p:cNvPr id="1" name=""/>
+        <p:cNvGrpSpPr/>
+        <p:nvPr/>
+      </p:nvGrpSpPr>
+      <p:grpSpPr>
+        <a:xfrm>
+          <a:off x="0" y="0"/>
+          <a:ext cx="0" cy="0"/>
+          <a:chOff x="0" y="0"/>
+          <a:chExt cx="0" cy="0"/>
+        </a:xfrm>
+      </p:grpSpPr>
+      <p:sp>
+        <p:nvSpPr>
+          <p:cNvPr id="42" name="Shape 42"/>
+          <p:cNvSpPr>
+            <a:spLocks noGrp="1"/>
+          </p:cNvSpPr>
+          <p:nvPr>
+            <p:ph type="title"/>
+          </p:nvPr>
+        </p:nvSpPr>
+        <p:spPr/>
+        <p:txBody>
+          <a:bodyPr/>
           <a:lstStyle>
             <a:lvl1pPr defTabSz="490727">
               <a:defRPr sz="6719"/>
             </a:lvl1pPr>
           </a:lstStyle>
           <a:p>
-            <a:pPr lvl="0">
-              <a:defRPr sz="1800"/>
-            </a:pPr>
-            <a:r>
-              <a:rPr sz="4700" dirty="0"/>
+            <a:pPr lvl="0"/>
+            <a:r>
+              <a:rPr lang="en-US" dirty="0"/>
               <a:t>Control Theory</a:t>
             </a:r>
           </a:p>
@@ -5934,140 +6758,82 @@
             <p:ph idx="1"/>
           </p:nvPr>
         </p:nvSpPr>
-        <p:spPr>
-          <a:prstGeom prst="rect">
-            <a:avLst/>
-          </a:prstGeom>
-        </p:spPr>
+        <p:spPr/>
         <p:txBody>
           <a:bodyPr>
-            <a:normAutofit fontScale="92500" lnSpcReduction="20000"/>
+            <a:normAutofit lnSpcReduction="10000"/>
           </a:bodyPr>
           <a:lstStyle/>
           <a:p>
-            <a:pPr marL="209394" indent="-209394" defTabSz="275203">
-              <a:spcBef>
-                <a:spcPts val="1969"/>
-              </a:spcBef>
-              <a:defRPr sz="1800"/>
-            </a:pPr>
-            <a:r>
-              <a:rPr sz="1600" dirty="0"/>
+            <a:r>
+              <a:rPr lang="en-US" dirty="0"/>
               <a:t>Making a physical system do what you want</a:t>
             </a:r>
           </a:p>
           <a:p>
-            <a:pPr marL="209394" indent="-209394" defTabSz="275203">
-              <a:spcBef>
-                <a:spcPts val="1969"/>
-              </a:spcBef>
-              <a:defRPr sz="1800"/>
-            </a:pPr>
-            <a:r>
-              <a:rPr sz="1600" dirty="0"/>
+            <a:r>
+              <a:rPr lang="en-US" dirty="0"/>
               <a:t>“Open loop” and “closed loop”</a:t>
             </a:r>
           </a:p>
           <a:p>
-            <a:pPr marL="209394" indent="-209394" defTabSz="275203">
-              <a:spcBef>
-                <a:spcPts val="1969"/>
-              </a:spcBef>
-              <a:defRPr sz="1800"/>
-            </a:pPr>
-            <a:r>
-              <a:rPr sz="1600" dirty="0"/>
+            <a:r>
+              <a:rPr lang="en-US" dirty="0"/>
               <a:t>Open loop - cannot see the system’s output</a:t>
             </a:r>
           </a:p>
           <a:p>
-            <a:pPr marL="418787" lvl="1" indent="-209394" defTabSz="275203">
-              <a:spcBef>
-                <a:spcPts val="1969"/>
-              </a:spcBef>
-              <a:defRPr sz="1800"/>
-            </a:pPr>
-            <a:r>
-              <a:rPr sz="1600" dirty="0"/>
+            <a:pPr lvl="1"/>
+            <a:r>
+              <a:rPr lang="en-US" dirty="0"/>
               <a:t>Motor controllers</a:t>
             </a:r>
           </a:p>
           <a:p>
-            <a:pPr marL="418787" lvl="1" indent="-209394" defTabSz="275203">
-              <a:spcBef>
-                <a:spcPts val="1969"/>
-              </a:spcBef>
-              <a:defRPr sz="1800"/>
-            </a:pPr>
-            <a:r>
-              <a:rPr sz="1600" dirty="0"/>
+            <a:pPr lvl="1"/>
+            <a:r>
+              <a:rPr lang="en-US" dirty="0"/>
               <a:t>LCD/LED/CRT screens</a:t>
             </a:r>
           </a:p>
           <a:p>
-            <a:pPr marL="418787" lvl="1" indent="-209394" defTabSz="275203">
-              <a:spcBef>
-                <a:spcPts val="1969"/>
-              </a:spcBef>
-              <a:defRPr sz="1800"/>
-            </a:pPr>
-            <a:r>
-              <a:rPr sz="1600" dirty="0"/>
+            <a:pPr lvl="1"/>
+            <a:r>
+              <a:rPr lang="en-US" dirty="0"/>
               <a:t>Some ICBMs</a:t>
             </a:r>
           </a:p>
           <a:p>
-            <a:pPr marL="209394" indent="-209394" defTabSz="275203">
-              <a:spcBef>
-                <a:spcPts val="1969"/>
-              </a:spcBef>
-              <a:defRPr sz="1800"/>
-            </a:pPr>
-            <a:r>
-              <a:rPr sz="1600" dirty="0"/>
+            <a:r>
+              <a:rPr lang="en-US" dirty="0"/>
               <a:t>Closed loop - Can see output, make </a:t>
             </a:r>
             <a:br>
-              <a:rPr sz="1600" dirty="0"/>
+              <a:rPr lang="en-US" dirty="0"/>
             </a:br>
             <a:r>
-              <a:rPr sz="1600" dirty="0"/>
+              <a:rPr lang="en-US" dirty="0"/>
               <a:t>corrections</a:t>
             </a:r>
           </a:p>
           <a:p>
-            <a:pPr marL="418787" lvl="1" indent="-209394" defTabSz="275203">
-              <a:spcBef>
-                <a:spcPts val="1969"/>
-              </a:spcBef>
-              <a:defRPr sz="1800"/>
-            </a:pPr>
-            <a:r>
-              <a:rPr sz="1600" dirty="0"/>
+            <a:pPr lvl="1"/>
+            <a:r>
+              <a:rPr lang="en-US" dirty="0"/>
               <a:t>Autopilot</a:t>
             </a:r>
           </a:p>
           <a:p>
-            <a:pPr marL="418787" lvl="1" indent="-209394" defTabSz="275203">
-              <a:spcBef>
-                <a:spcPts val="1969"/>
-              </a:spcBef>
-              <a:defRPr sz="1800"/>
-            </a:pPr>
-            <a:r>
-              <a:rPr sz="1600" dirty="0"/>
+            <a:pPr lvl="1"/>
+            <a:r>
+              <a:rPr lang="en-US" dirty="0"/>
               <a:t>GPS guided munitions</a:t>
             </a:r>
           </a:p>
           <a:p>
-            <a:pPr marL="418787" lvl="1" indent="-209394" defTabSz="275203">
-              <a:spcBef>
-                <a:spcPts val="1969"/>
-              </a:spcBef>
-              <a:defRPr sz="1800"/>
-            </a:pPr>
-            <a:r>
-              <a:rPr sz="1600" dirty="0"/>
+            <a:pPr lvl="1"/>
+            <a:r>
+              <a:rPr lang="en-US" dirty="0"/>
               <a:t>Our quadcopter</a:t>
             </a:r>
           </a:p>
@@ -6113,7 +6879,7 @@
 </p:sld>
 </file>
 
-<file path=ppt/slides/slide5.xml><?xml version="1.0" encoding="utf-8"?>
+<file path=ppt/slides/slide9.xml><?xml version="1.0" encoding="utf-8"?>
 <p:sld xmlns:a="http://schemas.openxmlformats.org/drawingml/2006/main" xmlns:r="http://schemas.openxmlformats.org/officeDocument/2006/relationships" xmlns:p="http://schemas.openxmlformats.org/presentationml/2006/main">
   <p:cSld>
     <p:spTree>
@@ -6333,859 +7099,6 @@
     <p:extLst>
       <p:ext uri="{BB962C8B-B14F-4D97-AF65-F5344CB8AC3E}">
         <p14:creationId xmlns:p14="http://schemas.microsoft.com/office/powerpoint/2010/main" val="567134624"/>
-      </p:ext>
-    </p:extLst>
-  </p:cSld>
-  <p:clrMapOvr>
-    <a:masterClrMapping/>
-  </p:clrMapOvr>
-</p:sld>
-</file>
-
-<file path=ppt/slides/slide6.xml><?xml version="1.0" encoding="utf-8"?>
-<p:sld xmlns:a="http://schemas.openxmlformats.org/drawingml/2006/main" xmlns:r="http://schemas.openxmlformats.org/officeDocument/2006/relationships" xmlns:p="http://schemas.openxmlformats.org/presentationml/2006/main">
-  <p:cSld>
-    <p:spTree>
-      <p:nvGrpSpPr>
-        <p:cNvPr id="1" name=""/>
-        <p:cNvGrpSpPr/>
-        <p:nvPr/>
-      </p:nvGrpSpPr>
-      <p:grpSpPr>
-        <a:xfrm>
-          <a:off x="0" y="0"/>
-          <a:ext cx="0" cy="0"/>
-          <a:chOff x="0" y="0"/>
-          <a:chExt cx="0" cy="0"/>
-        </a:xfrm>
-      </p:grpSpPr>
-      <p:sp>
-        <p:nvSpPr>
-          <p:cNvPr id="46" name="Shape 46"/>
-          <p:cNvSpPr>
-            <a:spLocks noGrp="1"/>
-          </p:cNvSpPr>
-          <p:nvPr>
-            <p:ph type="title"/>
-          </p:nvPr>
-        </p:nvSpPr>
-        <p:spPr>
-          <a:prstGeom prst="rect">
-            <a:avLst/>
-          </a:prstGeom>
-        </p:spPr>
-        <p:txBody>
-          <a:bodyPr>
-            <a:normAutofit/>
-          </a:bodyPr>
-          <a:lstStyle>
-            <a:lvl1pPr defTabSz="420624">
-              <a:defRPr sz="5760"/>
-            </a:lvl1pPr>
-          </a:lstStyle>
-          <a:p>
-            <a:pPr lvl="0">
-              <a:defRPr sz="1800"/>
-            </a:pPr>
-            <a:r>
-              <a:rPr sz="4000" dirty="0"/>
-              <a:t>Closed loop control</a:t>
-            </a:r>
-          </a:p>
-        </p:txBody>
-      </p:sp>
-      <p:sp>
-        <p:nvSpPr>
-          <p:cNvPr id="47" name="Shape 47"/>
-          <p:cNvSpPr>
-            <a:spLocks noGrp="1"/>
-          </p:cNvSpPr>
-          <p:nvPr>
-            <p:ph idx="1"/>
-          </p:nvPr>
-        </p:nvSpPr>
-        <p:spPr>
-          <a:prstGeom prst="rect">
-            <a:avLst/>
-          </a:prstGeom>
-        </p:spPr>
-        <p:txBody>
-          <a:bodyPr/>
-          <a:lstStyle/>
-          <a:p>
-            <a:pPr lvl="0">
-              <a:defRPr sz="1800"/>
-            </a:pPr>
-            <a:r>
-              <a:rPr sz="2500"/>
-              <a:t>PID is the most common closed loop controller</a:t>
-            </a:r>
-            <a:br>
-              <a:rPr sz="2500"/>
-            </a:br>
-            <a:br>
-              <a:rPr sz="2500"/>
-            </a:br>
-            <a:br>
-              <a:rPr sz="2500"/>
-            </a:br>
-            <a:endParaRPr sz="2500"/>
-          </a:p>
-          <a:p>
-            <a:pPr lvl="0">
-              <a:defRPr sz="1800"/>
-            </a:pPr>
-            <a:endParaRPr sz="2500"/>
-          </a:p>
-          <a:p>
-            <a:pPr lvl="0">
-              <a:defRPr sz="1800"/>
-            </a:pPr>
-            <a:r>
-              <a:rPr sz="2500"/>
-              <a:t>Proportional: Directly against error</a:t>
-            </a:r>
-          </a:p>
-          <a:p>
-            <a:pPr lvl="0">
-              <a:defRPr sz="1800"/>
-            </a:pPr>
-            <a:r>
-              <a:rPr sz="2500"/>
-              <a:t>Integral: Remembers error over time</a:t>
-            </a:r>
-          </a:p>
-          <a:p>
-            <a:pPr lvl="0">
-              <a:defRPr sz="1800"/>
-            </a:pPr>
-            <a:r>
-              <a:rPr sz="2500"/>
-              <a:t>Derivative: Dampens response to avoid oscillations</a:t>
-            </a:r>
-          </a:p>
-        </p:txBody>
-      </p:sp>
-      <p:pic>
-        <p:nvPicPr>
-          <p:cNvPr id="48" name="pidloop.png"/>
-          <p:cNvPicPr/>
-          <p:nvPr/>
-        </p:nvPicPr>
-        <p:blipFill>
-          <a:blip r:embed="rId2">
-            <a:extLst/>
-          </a:blip>
-          <a:stretch>
-            <a:fillRect/>
-          </a:stretch>
-        </p:blipFill>
-        <p:spPr>
-          <a:xfrm>
-            <a:off x="6021313" y="2417668"/>
-            <a:ext cx="4377956" cy="1492486"/>
-          </a:xfrm>
-          <a:prstGeom prst="rect">
-            <a:avLst/>
-          </a:prstGeom>
-          <a:ln w="12700">
-            <a:miter lim="400000"/>
-          </a:ln>
-        </p:spPr>
-      </p:pic>
-      <p:pic>
-        <p:nvPicPr>
-          <p:cNvPr id="49" name="CodeCogsEqn-2.png"/>
-          <p:cNvPicPr/>
-          <p:nvPr/>
-        </p:nvPicPr>
-        <p:blipFill>
-          <a:blip r:embed="rId3">
-            <a:extLst/>
-          </a:blip>
-          <a:stretch>
-            <a:fillRect/>
-          </a:stretch>
-        </p:blipFill>
-        <p:spPr>
-          <a:xfrm>
-            <a:off x="1915537" y="2881471"/>
-            <a:ext cx="3977529" cy="564880"/>
-          </a:xfrm>
-          <a:prstGeom prst="rect">
-            <a:avLst/>
-          </a:prstGeom>
-          <a:ln w="12700">
-            <a:miter lim="400000"/>
-          </a:ln>
-        </p:spPr>
-      </p:pic>
-    </p:spTree>
-    <p:extLst>
-      <p:ext uri="{BB962C8B-B14F-4D97-AF65-F5344CB8AC3E}">
-        <p14:creationId xmlns:p14="http://schemas.microsoft.com/office/powerpoint/2010/main" val="1474286658"/>
-      </p:ext>
-    </p:extLst>
-  </p:cSld>
-  <p:clrMapOvr>
-    <a:masterClrMapping/>
-  </p:clrMapOvr>
-</p:sld>
-</file>
-
-<file path=ppt/slides/slide7.xml><?xml version="1.0" encoding="utf-8"?>
-<p:sld xmlns:a="http://schemas.openxmlformats.org/drawingml/2006/main" xmlns:r="http://schemas.openxmlformats.org/officeDocument/2006/relationships" xmlns:p="http://schemas.openxmlformats.org/presentationml/2006/main">
-  <p:cSld>
-    <p:spTree>
-      <p:nvGrpSpPr>
-        <p:cNvPr id="1" name=""/>
-        <p:cNvGrpSpPr/>
-        <p:nvPr/>
-      </p:nvGrpSpPr>
-      <p:grpSpPr>
-        <a:xfrm>
-          <a:off x="0" y="0"/>
-          <a:ext cx="0" cy="0"/>
-          <a:chOff x="0" y="0"/>
-          <a:chExt cx="0" cy="0"/>
-        </a:xfrm>
-      </p:grpSpPr>
-      <p:sp>
-        <p:nvSpPr>
-          <p:cNvPr id="51" name="Shape 51"/>
-          <p:cNvSpPr>
-            <a:spLocks noGrp="1"/>
-          </p:cNvSpPr>
-          <p:nvPr>
-            <p:ph type="title"/>
-          </p:nvPr>
-        </p:nvSpPr>
-        <p:spPr>
-          <a:prstGeom prst="rect">
-            <a:avLst/>
-          </a:prstGeom>
-        </p:spPr>
-        <p:txBody>
-          <a:bodyPr/>
-          <a:lstStyle/>
-          <a:p>
-            <a:pPr lvl="0">
-              <a:defRPr sz="1800"/>
-            </a:pPr>
-            <a:r>
-              <a:rPr sz="5600" dirty="0"/>
-              <a:t>Example</a:t>
-            </a:r>
-          </a:p>
-        </p:txBody>
-      </p:sp>
-      <p:sp>
-        <p:nvSpPr>
-          <p:cNvPr id="52" name="Shape 52"/>
-          <p:cNvSpPr>
-            <a:spLocks noGrp="1"/>
-          </p:cNvSpPr>
-          <p:nvPr>
-            <p:ph idx="1"/>
-          </p:nvPr>
-        </p:nvSpPr>
-        <p:spPr>
-          <a:prstGeom prst="rect">
-            <a:avLst/>
-          </a:prstGeom>
-        </p:spPr>
-        <p:txBody>
-          <a:bodyPr anchor="t"/>
-          <a:lstStyle>
-            <a:lvl1pPr>
-              <a:defRPr u="sng">
-                <a:hlinkClick r:id="rId2"/>
-              </a:defRPr>
-            </a:lvl1pPr>
-          </a:lstStyle>
-          <a:p>
-            <a:pPr lvl="0">
-              <a:defRPr sz="1800" u="none"/>
-            </a:pPr>
-            <a:r>
-              <a:rPr sz="2500" dirty="0"/>
-              <a:t>https://sites.google.com/site/fpgaandco/pid</a:t>
-            </a:r>
-          </a:p>
-        </p:txBody>
-      </p:sp>
-      <p:pic>
-        <p:nvPicPr>
-          <p:cNvPr id="2" name="Picture 1"/>
-          <p:cNvPicPr>
-            <a:picLocks noChangeAspect="1"/>
-          </p:cNvPicPr>
-          <p:nvPr/>
-        </p:nvPicPr>
-        <p:blipFill>
-          <a:blip r:embed="rId3"/>
-          <a:stretch>
-            <a:fillRect/>
-          </a:stretch>
-        </p:blipFill>
-        <p:spPr>
-          <a:xfrm>
-            <a:off x="3671315" y="2498087"/>
-            <a:ext cx="4957828" cy="3752694"/>
-          </a:xfrm>
-          <a:prstGeom prst="rect">
-            <a:avLst/>
-          </a:prstGeom>
-        </p:spPr>
-      </p:pic>
-    </p:spTree>
-    <p:extLst>
-      <p:ext uri="{BB962C8B-B14F-4D97-AF65-F5344CB8AC3E}">
-        <p14:creationId xmlns:p14="http://schemas.microsoft.com/office/powerpoint/2010/main" val="2008722993"/>
-      </p:ext>
-    </p:extLst>
-  </p:cSld>
-  <p:clrMapOvr>
-    <a:masterClrMapping/>
-  </p:clrMapOvr>
-</p:sld>
-</file>
-
-<file path=ppt/slides/slide8.xml><?xml version="1.0" encoding="utf-8"?>
-<p:sld xmlns:a="http://schemas.openxmlformats.org/drawingml/2006/main" xmlns:r="http://schemas.openxmlformats.org/officeDocument/2006/relationships" xmlns:p="http://schemas.openxmlformats.org/presentationml/2006/main">
-  <p:cSld>
-    <p:spTree>
-      <p:nvGrpSpPr>
-        <p:cNvPr id="1" name=""/>
-        <p:cNvGrpSpPr/>
-        <p:nvPr/>
-      </p:nvGrpSpPr>
-      <p:grpSpPr>
-        <a:xfrm>
-          <a:off x="0" y="0"/>
-          <a:ext cx="0" cy="0"/>
-          <a:chOff x="0" y="0"/>
-          <a:chExt cx="0" cy="0"/>
-        </a:xfrm>
-      </p:grpSpPr>
-      <p:sp>
-        <p:nvSpPr>
-          <p:cNvPr id="55" name="Shape 55"/>
-          <p:cNvSpPr>
-            <a:spLocks noGrp="1"/>
-          </p:cNvSpPr>
-          <p:nvPr>
-            <p:ph type="title"/>
-          </p:nvPr>
-        </p:nvSpPr>
-        <p:spPr>
-          <a:prstGeom prst="rect">
-            <a:avLst/>
-          </a:prstGeom>
-        </p:spPr>
-        <p:txBody>
-          <a:bodyPr/>
-          <a:lstStyle/>
-          <a:p>
-            <a:pPr lvl="0">
-              <a:defRPr sz="1800"/>
-            </a:pPr>
-            <a:r>
-              <a:rPr sz="5600"/>
-              <a:t>PID on the Quadcopter</a:t>
-            </a:r>
-          </a:p>
-        </p:txBody>
-      </p:sp>
-      <p:sp>
-        <p:nvSpPr>
-          <p:cNvPr id="56" name="Shape 56"/>
-          <p:cNvSpPr>
-            <a:spLocks noGrp="1"/>
-          </p:cNvSpPr>
-          <p:nvPr>
-            <p:ph idx="1"/>
-          </p:nvPr>
-        </p:nvSpPr>
-        <p:spPr>
-          <a:prstGeom prst="rect">
-            <a:avLst/>
-          </a:prstGeom>
-        </p:spPr>
-        <p:txBody>
-          <a:bodyPr/>
-          <a:lstStyle/>
-          <a:p>
-            <a:pPr lvl="0">
-              <a:defRPr sz="1800"/>
-            </a:pPr>
-            <a:r>
-              <a:rPr sz="2500"/>
-              <a:t>3 separate controllers</a:t>
-            </a:r>
-          </a:p>
-          <a:p>
-            <a:pPr lvl="0">
-              <a:defRPr sz="1800"/>
-            </a:pPr>
-            <a:r>
-              <a:rPr sz="2500"/>
-              <a:t>PID set point is from user</a:t>
-            </a:r>
-          </a:p>
-        </p:txBody>
-      </p:sp>
-      <p:pic>
-        <p:nvPicPr>
-          <p:cNvPr id="57" name="pasted-image.tif"/>
-          <p:cNvPicPr/>
-          <p:nvPr/>
-        </p:nvPicPr>
-        <p:blipFill>
-          <a:blip r:embed="rId2">
-            <a:extLst/>
-          </a:blip>
-          <a:srcRect b="6714"/>
-          <a:stretch>
-            <a:fillRect/>
-          </a:stretch>
-        </p:blipFill>
-        <p:spPr>
-          <a:xfrm>
-            <a:off x="4295413" y="2806155"/>
-            <a:ext cx="3601077" cy="2478043"/>
-          </a:xfrm>
-          <a:prstGeom prst="rect">
-            <a:avLst/>
-          </a:prstGeom>
-          <a:ln w="12700">
-            <a:miter lim="400000"/>
-          </a:ln>
-        </p:spPr>
-      </p:pic>
-    </p:spTree>
-    <p:extLst>
-      <p:ext uri="{BB962C8B-B14F-4D97-AF65-F5344CB8AC3E}">
-        <p14:creationId xmlns:p14="http://schemas.microsoft.com/office/powerpoint/2010/main" val="3207057768"/>
-      </p:ext>
-    </p:extLst>
-  </p:cSld>
-  <p:clrMapOvr>
-    <a:masterClrMapping/>
-  </p:clrMapOvr>
-</p:sld>
-</file>
-
-<file path=ppt/slides/slide9.xml><?xml version="1.0" encoding="utf-8"?>
-<p:sld xmlns:a="http://schemas.openxmlformats.org/drawingml/2006/main" xmlns:r="http://schemas.openxmlformats.org/officeDocument/2006/relationships" xmlns:p="http://schemas.openxmlformats.org/presentationml/2006/main">
-  <p:cSld>
-    <p:spTree>
-      <p:nvGrpSpPr>
-        <p:cNvPr id="1" name=""/>
-        <p:cNvGrpSpPr/>
-        <p:nvPr/>
-      </p:nvGrpSpPr>
-      <p:grpSpPr>
-        <a:xfrm>
-          <a:off x="0" y="0"/>
-          <a:ext cx="0" cy="0"/>
-          <a:chOff x="0" y="0"/>
-          <a:chExt cx="0" cy="0"/>
-        </a:xfrm>
-      </p:grpSpPr>
-      <p:sp>
-        <p:nvSpPr>
-          <p:cNvPr id="59" name="Shape 59"/>
-          <p:cNvSpPr>
-            <a:spLocks noGrp="1"/>
-          </p:cNvSpPr>
-          <p:nvPr>
-            <p:ph type="title"/>
-          </p:nvPr>
-        </p:nvSpPr>
-        <p:spPr>
-          <a:prstGeom prst="rect">
-            <a:avLst/>
-          </a:prstGeom>
-        </p:spPr>
-        <p:txBody>
-          <a:bodyPr>
-            <a:normAutofit/>
-          </a:bodyPr>
-          <a:lstStyle>
-            <a:lvl1pPr defTabSz="514095">
-              <a:defRPr sz="7040"/>
-            </a:lvl1pPr>
-          </a:lstStyle>
-          <a:p>
-            <a:pPr lvl="0">
-              <a:defRPr sz="1800"/>
-            </a:pPr>
-            <a:r>
-              <a:rPr sz="4900" dirty="0"/>
-              <a:t>Pitfalls of PID</a:t>
-            </a:r>
-          </a:p>
-        </p:txBody>
-      </p:sp>
-      <p:sp>
-        <p:nvSpPr>
-          <p:cNvPr id="60" name="Shape 60"/>
-          <p:cNvSpPr>
-            <a:spLocks noGrp="1"/>
-          </p:cNvSpPr>
-          <p:nvPr>
-            <p:ph idx="1"/>
-          </p:nvPr>
-        </p:nvSpPr>
-        <p:spPr>
-          <a:prstGeom prst="rect">
-            <a:avLst/>
-          </a:prstGeom>
-        </p:spPr>
-        <p:txBody>
-          <a:bodyPr/>
-          <a:lstStyle/>
-          <a:p>
-            <a:pPr marL="316993" indent="-316993" defTabSz="291633">
-              <a:spcBef>
-                <a:spcPts val="2039"/>
-              </a:spcBef>
-              <a:buSzPct val="100000"/>
-              <a:buAutoNum type="arabicPeriod"/>
-              <a:defRPr sz="1800"/>
-            </a:pPr>
-            <a:r>
-              <a:rPr sz="1800" dirty="0"/>
-              <a:t>Integral term “Windup”</a:t>
-            </a:r>
-          </a:p>
-          <a:p>
-            <a:pPr marL="443789" lvl="1" indent="-221894" defTabSz="291633">
-              <a:spcBef>
-                <a:spcPts val="2039"/>
-              </a:spcBef>
-              <a:defRPr sz="1800"/>
-            </a:pPr>
-            <a:r>
-              <a:rPr sz="1800" dirty="0"/>
-              <a:t>One solution: </a:t>
-            </a:r>
-            <a:r>
-              <a:rPr lang="x-none" sz="1800" dirty="0"/>
-              <a:t>Exponential decay on integral (E.g., I = I/2 + error)</a:t>
-            </a:r>
-            <a:endParaRPr sz="1800" dirty="0"/>
-          </a:p>
-          <a:p>
-            <a:pPr marL="316993" indent="-316993" defTabSz="291633">
-              <a:spcBef>
-                <a:spcPts val="2039"/>
-              </a:spcBef>
-              <a:buSzPct val="100000"/>
-              <a:buAutoNum type="arabicPeriod" startAt="2"/>
-              <a:defRPr sz="1800"/>
-            </a:pPr>
-            <a:r>
-              <a:rPr sz="1800" dirty="0"/>
-              <a:t>Derivative noise: beware of vibrations</a:t>
-            </a:r>
-          </a:p>
-        </p:txBody>
-      </p:sp>
-      <p:grpSp>
-        <p:nvGrpSpPr>
-          <p:cNvPr id="2" name="Group 1"/>
-          <p:cNvGrpSpPr/>
-          <p:nvPr/>
-        </p:nvGrpSpPr>
-        <p:grpSpPr>
-          <a:xfrm>
-            <a:off x="2357408" y="2796046"/>
-            <a:ext cx="6282726" cy="1754846"/>
-            <a:chOff x="1185291" y="3976598"/>
-            <a:chExt cx="10989096" cy="3069396"/>
-          </a:xfrm>
-        </p:grpSpPr>
-        <p:pic>
-          <p:nvPicPr>
-            <p:cNvPr id="61" name="noisepid.png"/>
-            <p:cNvPicPr/>
-            <p:nvPr/>
-          </p:nvPicPr>
-          <p:blipFill>
-            <a:blip r:embed="rId2">
-              <a:extLst/>
-            </a:blip>
-            <a:stretch>
-              <a:fillRect/>
-            </a:stretch>
-          </p:blipFill>
-          <p:spPr>
-            <a:xfrm>
-              <a:off x="1185291" y="3976598"/>
-              <a:ext cx="3838257" cy="3069396"/>
-            </a:xfrm>
-            <a:prstGeom prst="rect">
-              <a:avLst/>
-            </a:prstGeom>
-            <a:ln w="12700">
-              <a:miter lim="400000"/>
-            </a:ln>
-          </p:spPr>
-        </p:pic>
-        <p:pic>
-          <p:nvPicPr>
-            <p:cNvPr id="62" name="noisederivpid.png"/>
-            <p:cNvPicPr/>
-            <p:nvPr/>
-          </p:nvPicPr>
-          <p:blipFill>
-            <a:blip r:embed="rId3">
-              <a:extLst/>
-            </a:blip>
-            <a:stretch>
-              <a:fillRect/>
-            </a:stretch>
-          </p:blipFill>
-          <p:spPr>
-            <a:xfrm>
-              <a:off x="7694346" y="3976598"/>
-              <a:ext cx="4480041" cy="3069396"/>
-            </a:xfrm>
-            <a:prstGeom prst="rect">
-              <a:avLst/>
-            </a:prstGeom>
-            <a:ln w="12700">
-              <a:miter lim="400000"/>
-            </a:ln>
-          </p:spPr>
-        </p:pic>
-        <p:sp>
-          <p:nvSpPr>
-            <p:cNvPr id="63" name="Shape 63"/>
-            <p:cNvSpPr/>
-            <p:nvPr/>
-          </p:nvSpPr>
-          <p:spPr>
-            <a:xfrm>
-              <a:off x="5867400" y="4876296"/>
-              <a:ext cx="1270000" cy="1270001"/>
-            </a:xfrm>
-            <a:prstGeom prst="rightArrow">
-              <a:avLst>
-                <a:gd name="adj1" fmla="val 32000"/>
-                <a:gd name="adj2" fmla="val 64000"/>
-              </a:avLst>
-            </a:prstGeom>
-            <a:blipFill>
-              <a:blip r:embed="rId4"/>
-            </a:blipFill>
-            <a:ln w="12700">
-              <a:miter lim="400000"/>
-            </a:ln>
-            <a:effectLst>
-              <a:outerShdw blurRad="38100" dist="25400" dir="5400000" rotWithShape="0">
-                <a:srgbClr val="000000">
-                  <a:alpha val="50000"/>
-                </a:srgbClr>
-              </a:outerShdw>
-            </a:effectLst>
-          </p:spPr>
-          <p:txBody>
-            <a:bodyPr lIns="50800" tIns="50800" rIns="50800" bIns="50800" anchor="ctr"/>
-            <a:lstStyle/>
-            <a:p>
-              <a:pPr lvl="0">
-                <a:defRPr sz="2400">
-                  <a:solidFill>
-                    <a:srgbClr val="FFFFFF"/>
-                  </a:solidFill>
-                </a:defRPr>
-              </a:pPr>
-              <a:endParaRPr sz="2400"/>
-            </a:p>
-          </p:txBody>
-        </p:sp>
-      </p:grpSp>
-      <p:sp>
-        <p:nvSpPr>
-          <p:cNvPr id="64" name="Shape 64"/>
-          <p:cNvSpPr/>
-          <p:nvPr/>
-        </p:nvSpPr>
-        <p:spPr>
-          <a:xfrm>
-            <a:off x="2474797" y="4563594"/>
-            <a:ext cx="1115336" cy="195242"/>
-          </a:xfrm>
-          <a:prstGeom prst="rect">
-            <a:avLst/>
-          </a:prstGeom>
-          <a:ln w="12700">
-            <a:miter lim="400000"/>
-          </a:ln>
-          <a:extLst>
-            <a:ext uri="{C572A759-6A51-4108-AA02-DFA0A04FC94B}">
-              <ma14:wrappingTextBoxFlag xmlns:ma14="http://schemas.microsoft.com/office/mac/drawingml/2011/main" xmlns="" val="1"/>
-            </a:ext>
-          </a:extLst>
-        </p:spPr>
-        <p:txBody>
-          <a:bodyPr wrap="none" lIns="35717" tIns="35717" rIns="35717" bIns="35717" anchor="ctr">
-            <a:spAutoFit/>
-          </a:bodyPr>
-          <a:lstStyle>
-            <a:lvl1pPr>
-              <a:defRPr sz="1200"/>
-            </a:lvl1pPr>
-          </a:lstStyle>
-          <a:p>
-            <a:pPr lvl="0">
-              <a:defRPr sz="1800"/>
-            </a:pPr>
-            <a:r>
-              <a:rPr sz="800"/>
-              <a:t>Error term with vibration</a:t>
-            </a:r>
-          </a:p>
-        </p:txBody>
-      </p:sp>
-      <p:sp>
-        <p:nvSpPr>
-          <p:cNvPr id="65" name="Shape 65"/>
-          <p:cNvSpPr/>
-          <p:nvPr/>
-        </p:nvSpPr>
-        <p:spPr>
-          <a:xfrm>
-            <a:off x="6820446" y="4563594"/>
-            <a:ext cx="2085603" cy="195242"/>
-          </a:xfrm>
-          <a:prstGeom prst="rect">
-            <a:avLst/>
-          </a:prstGeom>
-          <a:ln w="12700">
-            <a:miter lim="400000"/>
-          </a:ln>
-          <a:extLst>
-            <a:ext uri="{C572A759-6A51-4108-AA02-DFA0A04FC94B}">
-              <ma14:wrappingTextBoxFlag xmlns:ma14="http://schemas.microsoft.com/office/mac/drawingml/2011/main" xmlns="" val="1"/>
-            </a:ext>
-          </a:extLst>
-        </p:spPr>
-        <p:txBody>
-          <a:bodyPr wrap="none" lIns="35717" tIns="35717" rIns="35717" bIns="35717" anchor="ctr">
-            <a:spAutoFit/>
-          </a:bodyPr>
-          <a:lstStyle>
-            <a:lvl1pPr>
-              <a:defRPr sz="1200"/>
-            </a:lvl1pPr>
-          </a:lstStyle>
-          <a:p>
-            <a:pPr lvl="0">
-              <a:defRPr sz="1800"/>
-            </a:pPr>
-            <a:r>
-              <a:rPr sz="800"/>
-              <a:t>Derivative term causes your system to go insane</a:t>
-            </a:r>
-          </a:p>
-        </p:txBody>
-      </p:sp>
-      <p:sp>
-        <p:nvSpPr>
-          <p:cNvPr id="66" name="Shape 66"/>
-          <p:cNvSpPr/>
-          <p:nvPr/>
-        </p:nvSpPr>
-        <p:spPr>
-          <a:xfrm>
-            <a:off x="2263654" y="5043153"/>
-            <a:ext cx="7664695" cy="1439597"/>
-          </a:xfrm>
-          <a:prstGeom prst="rect">
-            <a:avLst/>
-          </a:prstGeom>
-          <a:ln w="12700">
-            <a:miter lim="400000"/>
-          </a:ln>
-          <a:extLst>
-            <a:ext uri="{C572A759-6A51-4108-AA02-DFA0A04FC94B}">
-              <ma14:wrappingTextBoxFlag xmlns:ma14="http://schemas.microsoft.com/office/mac/drawingml/2011/main" xmlns="" val="1"/>
-            </a:ext>
-          </a:extLst>
-        </p:spPr>
-        <p:txBody>
-          <a:bodyPr lIns="0" tIns="0" rIns="0" bIns="0" anchor="ctr">
-            <a:noAutofit/>
-          </a:bodyPr>
-          <a:lstStyle/>
-          <a:p>
-            <a:pPr marL="368782" lvl="1" indent="-184391" defTabSz="242342">
-              <a:spcBef>
-                <a:spcPts val="1687"/>
-              </a:spcBef>
-              <a:buSzPct val="75000"/>
-              <a:buChar char="•"/>
-              <a:defRPr sz="1800"/>
-            </a:pPr>
-            <a:r>
-              <a:rPr sz="2000" dirty="0"/>
-              <a:t>Solution: </a:t>
-            </a:r>
-            <a:r>
-              <a:rPr lang="x-none" sz="2000" dirty="0"/>
-              <a:t>moving average of last several values.  Or median of last several values.</a:t>
-            </a:r>
-          </a:p>
-          <a:p>
-            <a:pPr marL="368782" lvl="1" indent="-184391" defTabSz="242342">
-              <a:spcBef>
-                <a:spcPts val="1687"/>
-              </a:spcBef>
-              <a:buSzPct val="75000"/>
-              <a:buChar char="•"/>
-              <a:defRPr sz="1800"/>
-            </a:pPr>
-            <a:r>
-              <a:rPr lang="x-none" sz="2000" dirty="0"/>
-              <a:t>Using the serial plotter in arduino to watch the D term.</a:t>
-            </a:r>
-            <a:endParaRPr sz="2000" dirty="0"/>
-          </a:p>
-          <a:p>
-            <a:pPr defTabSz="242342">
-              <a:spcBef>
-                <a:spcPts val="1687"/>
-              </a:spcBef>
-              <a:defRPr sz="1800"/>
-            </a:pPr>
-            <a:r>
-              <a:rPr sz="2000" dirty="0"/>
-              <a:t>3. Tweaking PID values</a:t>
-            </a:r>
-            <a:endParaRPr lang="x-none" sz="2000" dirty="0"/>
-          </a:p>
-          <a:p>
-            <a:pPr defTabSz="242342">
-              <a:spcBef>
-                <a:spcPts val="1687"/>
-              </a:spcBef>
-              <a:defRPr sz="1800"/>
-            </a:pPr>
-            <a:r>
-              <a:rPr lang="x-none" sz="2000" dirty="0"/>
-              <a:t>	Tune P first, then D, then I.</a:t>
-            </a:r>
-          </a:p>
-        </p:txBody>
-      </p:sp>
-    </p:spTree>
-    <p:extLst>
-      <p:ext uri="{BB962C8B-B14F-4D97-AF65-F5344CB8AC3E}">
-        <p14:creationId xmlns:p14="http://schemas.microsoft.com/office/powerpoint/2010/main" val="188827023"/>
       </p:ext>
     </p:extLst>
   </p:cSld>

</xml_diff>

<commit_message>
Many updates for 2021
</commit_message>
<xml_diff>
--- a/labs/Implementing-PID/Implementing-PID.pptx
+++ b/labs/Implementing-PID/Implementing-PID.pptx
@@ -278,7 +278,7 @@
           <a:p>
             <a:fld id="{FEC42D17-91DA-8944-ACC7-FABA3CF20D0E}" type="datetimeFigureOut">
               <a:rPr lang="en-US" smtClean="0"/>
-              <a:t>5/7/19</a:t>
+              <a:t>12/23/20</a:t>
             </a:fld>
             <a:endParaRPr lang="en-US"/>
           </a:p>
@@ -476,7 +476,7 @@
           <a:p>
             <a:fld id="{FEC42D17-91DA-8944-ACC7-FABA3CF20D0E}" type="datetimeFigureOut">
               <a:rPr lang="en-US" smtClean="0"/>
-              <a:t>5/7/19</a:t>
+              <a:t>12/23/20</a:t>
             </a:fld>
             <a:endParaRPr lang="en-US"/>
           </a:p>
@@ -684,7 +684,7 @@
           <a:p>
             <a:fld id="{FEC42D17-91DA-8944-ACC7-FABA3CF20D0E}" type="datetimeFigureOut">
               <a:rPr lang="en-US" smtClean="0"/>
-              <a:t>5/7/19</a:t>
+              <a:t>12/23/20</a:t>
             </a:fld>
             <a:endParaRPr lang="en-US"/>
           </a:p>
@@ -882,7 +882,7 @@
           <a:p>
             <a:fld id="{FEC42D17-91DA-8944-ACC7-FABA3CF20D0E}" type="datetimeFigureOut">
               <a:rPr lang="en-US" smtClean="0"/>
-              <a:t>5/7/19</a:t>
+              <a:t>12/23/20</a:t>
             </a:fld>
             <a:endParaRPr lang="en-US"/>
           </a:p>
@@ -1157,7 +1157,7 @@
           <a:p>
             <a:fld id="{FEC42D17-91DA-8944-ACC7-FABA3CF20D0E}" type="datetimeFigureOut">
               <a:rPr lang="en-US" smtClean="0"/>
-              <a:t>5/7/19</a:t>
+              <a:t>12/23/20</a:t>
             </a:fld>
             <a:endParaRPr lang="en-US"/>
           </a:p>
@@ -1422,7 +1422,7 @@
           <a:p>
             <a:fld id="{FEC42D17-91DA-8944-ACC7-FABA3CF20D0E}" type="datetimeFigureOut">
               <a:rPr lang="en-US" smtClean="0"/>
-              <a:t>5/7/19</a:t>
+              <a:t>12/23/20</a:t>
             </a:fld>
             <a:endParaRPr lang="en-US"/>
           </a:p>
@@ -1834,7 +1834,7 @@
           <a:p>
             <a:fld id="{FEC42D17-91DA-8944-ACC7-FABA3CF20D0E}" type="datetimeFigureOut">
               <a:rPr lang="en-US" smtClean="0"/>
-              <a:t>5/7/19</a:t>
+              <a:t>12/23/20</a:t>
             </a:fld>
             <a:endParaRPr lang="en-US"/>
           </a:p>
@@ -1975,7 +1975,7 @@
           <a:p>
             <a:fld id="{FEC42D17-91DA-8944-ACC7-FABA3CF20D0E}" type="datetimeFigureOut">
               <a:rPr lang="en-US" smtClean="0"/>
-              <a:t>5/7/19</a:t>
+              <a:t>12/23/20</a:t>
             </a:fld>
             <a:endParaRPr lang="en-US"/>
           </a:p>
@@ -2088,7 +2088,7 @@
           <a:p>
             <a:fld id="{FEC42D17-91DA-8944-ACC7-FABA3CF20D0E}" type="datetimeFigureOut">
               <a:rPr lang="en-US" smtClean="0"/>
-              <a:t>5/7/19</a:t>
+              <a:t>12/23/20</a:t>
             </a:fld>
             <a:endParaRPr lang="en-US"/>
           </a:p>
@@ -2399,7 +2399,7 @@
           <a:p>
             <a:fld id="{FEC42D17-91DA-8944-ACC7-FABA3CF20D0E}" type="datetimeFigureOut">
               <a:rPr lang="en-US" smtClean="0"/>
-              <a:t>5/7/19</a:t>
+              <a:t>12/23/20</a:t>
             </a:fld>
             <a:endParaRPr lang="en-US"/>
           </a:p>
@@ -2687,7 +2687,7 @@
           <a:p>
             <a:fld id="{FEC42D17-91DA-8944-ACC7-FABA3CF20D0E}" type="datetimeFigureOut">
               <a:rPr lang="en-US" smtClean="0"/>
-              <a:t>5/7/19</a:t>
+              <a:t>12/23/20</a:t>
             </a:fld>
             <a:endParaRPr lang="en-US"/>
           </a:p>
@@ -2928,7 +2928,7 @@
           <a:p>
             <a:fld id="{FEC42D17-91DA-8944-ACC7-FABA3CF20D0E}" type="datetimeFigureOut">
               <a:rPr lang="en-US" smtClean="0"/>
-              <a:t>5/7/19</a:t>
+              <a:t>12/23/20</a:t>
             </a:fld>
             <a:endParaRPr lang="en-US"/>
           </a:p>
@@ -3530,9 +3530,7 @@
           <p:nvPr/>
         </p:nvPicPr>
         <p:blipFill>
-          <a:blip r:embed="rId2">
-            <a:extLst/>
-          </a:blip>
+          <a:blip r:embed="rId2"/>
           <a:stretch>
             <a:fillRect/>
           </a:stretch>
@@ -3557,9 +3555,7 @@
           <p:nvPr/>
         </p:nvPicPr>
         <p:blipFill>
-          <a:blip r:embed="rId3">
-            <a:extLst/>
-          </a:blip>
+          <a:blip r:embed="rId3"/>
           <a:stretch>
             <a:fillRect/>
           </a:stretch>
@@ -3794,30 +3790,49 @@
       </p:sp>
       <p:pic>
         <p:nvPicPr>
-          <p:cNvPr id="57" name="pasted-image.tif"/>
-          <p:cNvPicPr/>
+          <p:cNvPr id="1028" name="Picture 4">
+            <a:extLst>
+              <a:ext uri="{FF2B5EF4-FFF2-40B4-BE49-F238E27FC236}">
+                <a16:creationId xmlns:a16="http://schemas.microsoft.com/office/drawing/2014/main" id="{0FC62BDA-9360-4E4F-811F-2659B5B423F9}"/>
+              </a:ext>
+            </a:extLst>
+          </p:cNvPr>
+          <p:cNvPicPr>
+            <a:picLocks noChangeAspect="1" noChangeArrowheads="1"/>
+          </p:cNvPicPr>
           <p:nvPr/>
         </p:nvPicPr>
         <p:blipFill>
           <a:blip r:embed="rId2">
-            <a:extLst/>
+            <a:extLst>
+              <a:ext uri="{28A0092B-C50C-407E-A947-70E740481C1C}">
+                <a14:useLocalDpi xmlns:a14="http://schemas.microsoft.com/office/drawing/2010/main" val="0"/>
+              </a:ext>
+            </a:extLst>
           </a:blip>
-          <a:srcRect b="6714"/>
+          <a:srcRect/>
           <a:stretch>
             <a:fillRect/>
           </a:stretch>
         </p:blipFill>
-        <p:spPr>
+        <p:spPr bwMode="auto">
           <a:xfrm>
-            <a:off x="4295413" y="2806155"/>
-            <a:ext cx="3601077" cy="2478043"/>
+            <a:off x="3807327" y="2333475"/>
+            <a:ext cx="4871118" cy="3661927"/>
           </a:xfrm>
           <a:prstGeom prst="rect">
             <a:avLst/>
           </a:prstGeom>
-          <a:ln w="12700">
-            <a:miter lim="400000"/>
-          </a:ln>
+          <a:noFill/>
+          <a:extLst>
+            <a:ext uri="{909E8E84-426E-40DD-AFC4-6F175D3DCCD1}">
+              <a14:hiddenFill xmlns:a14="http://schemas.microsoft.com/office/drawing/2010/main">
+                <a:solidFill>
+                  <a:srgbClr val="FFFFFF"/>
+                </a:solidFill>
+              </a14:hiddenFill>
+            </a:ext>
+          </a:extLst>
         </p:spPr>
       </p:pic>
     </p:spTree>
@@ -3971,9 +3986,7 @@
             <p:nvPr/>
           </p:nvPicPr>
           <p:blipFill>
-            <a:blip r:embed="rId2">
-              <a:extLst/>
-            </a:blip>
+            <a:blip r:embed="rId2"/>
             <a:stretch>
               <a:fillRect/>
             </a:stretch>
@@ -3998,9 +4011,7 @@
             <p:nvPr/>
           </p:nvPicPr>
           <p:blipFill>
-            <a:blip r:embed="rId3">
-              <a:extLst/>
-            </a:blip>
+            <a:blip r:embed="rId3"/>
             <a:stretch>
               <a:fillRect/>
             </a:stretch>
@@ -4084,7 +4095,7 @@
           </a:ln>
           <a:extLst>
             <a:ext uri="{C572A759-6A51-4108-AA02-DFA0A04FC94B}">
-              <ma14:wrappingTextBoxFlag xmlns="" xmlns:ma14="http://schemas.microsoft.com/office/mac/drawingml/2011/main" val="1"/>
+              <ma14:wrappingTextBoxFlag xmlns:ma14="http://schemas.microsoft.com/office/mac/drawingml/2011/main" xmlns="" val="1"/>
             </a:ext>
           </a:extLst>
         </p:spPr>
@@ -4127,7 +4138,7 @@
           </a:ln>
           <a:extLst>
             <a:ext uri="{C572A759-6A51-4108-AA02-DFA0A04FC94B}">
-              <ma14:wrappingTextBoxFlag xmlns="" xmlns:ma14="http://schemas.microsoft.com/office/mac/drawingml/2011/main" val="1"/>
+              <ma14:wrappingTextBoxFlag xmlns:ma14="http://schemas.microsoft.com/office/mac/drawingml/2011/main" xmlns="" val="1"/>
             </a:ext>
           </a:extLst>
         </p:spPr>
@@ -4170,7 +4181,7 @@
           </a:ln>
           <a:extLst>
             <a:ext uri="{C572A759-6A51-4108-AA02-DFA0A04FC94B}">
-              <ma14:wrappingTextBoxFlag xmlns="" xmlns:ma14="http://schemas.microsoft.com/office/mac/drawingml/2011/main" val="1"/>
+              <ma14:wrappingTextBoxFlag xmlns:ma14="http://schemas.microsoft.com/office/mac/drawingml/2011/main" xmlns="" val="1"/>
             </a:ext>
           </a:extLst>
         </p:spPr>
@@ -4474,9 +4485,7 @@
           <p:cNvGraphicFramePr>
             <a:graphicFrameLocks/>
           </p:cNvGraphicFramePr>
-          <p:nvPr>
-            <p:extLst/>
-          </p:nvPr>
+          <p:nvPr/>
         </p:nvGraphicFramePr>
         <p:xfrm>
           <a:off x="3149259" y="3104869"/>
@@ -6846,9 +6855,7 @@
           <p:nvPr/>
         </p:nvPicPr>
         <p:blipFill>
-          <a:blip r:embed="rId2">
-            <a:extLst/>
-          </a:blip>
+          <a:blip r:embed="rId2"/>
           <a:stretch>
             <a:fillRect/>
           </a:stretch>
@@ -7048,9 +7055,7 @@
           <p:nvPr/>
         </p:nvPicPr>
         <p:blipFill>
-          <a:blip r:embed="rId2">
-            <a:extLst/>
-          </a:blip>
+          <a:blip r:embed="rId2"/>
           <a:stretch>
             <a:fillRect/>
           </a:stretch>
@@ -7075,9 +7080,7 @@
           <p:nvPr/>
         </p:nvPicPr>
         <p:blipFill>
-          <a:blip r:embed="rId3">
-            <a:extLst/>
-          </a:blip>
+          <a:blip r:embed="rId3"/>
           <a:stretch>
             <a:fillRect/>
           </a:stretch>

</xml_diff>